<commit_message>
slight work on poster
</commit_message>
<xml_diff>
--- a/ThesisPoster.pptx
+++ b/ThesisPoster.pptx
@@ -197,7 +197,7 @@
           <a:p>
             <a:fld id="{4F3C5630-2B26-2E4F-A71D-2F7761DC7C75}" type="datetimeFigureOut">
               <a:rPr lang="en-US" smtClean="0"/>
-              <a:t>4/3/19</a:t>
+              <a:t>4/10/19</a:t>
             </a:fld>
             <a:endParaRPr lang="en-US"/>
           </a:p>
@@ -682,7 +682,7 @@
           <a:p>
             <a:fld id="{C9D44494-28C3-BB4E-9A33-83B3A960621F}" type="datetimeFigureOut">
               <a:rPr lang="en-US" smtClean="0"/>
-              <a:t>4/3/19</a:t>
+              <a:t>4/10/19</a:t>
             </a:fld>
             <a:endParaRPr lang="en-US"/>
           </a:p>
@@ -852,7 +852,7 @@
           <a:p>
             <a:fld id="{C9D44494-28C3-BB4E-9A33-83B3A960621F}" type="datetimeFigureOut">
               <a:rPr lang="en-US" smtClean="0"/>
-              <a:t>4/3/19</a:t>
+              <a:t>4/10/19</a:t>
             </a:fld>
             <a:endParaRPr lang="en-US"/>
           </a:p>
@@ -1032,7 +1032,7 @@
           <a:p>
             <a:fld id="{C9D44494-28C3-BB4E-9A33-83B3A960621F}" type="datetimeFigureOut">
               <a:rPr lang="en-US" smtClean="0"/>
-              <a:t>4/3/19</a:t>
+              <a:t>4/10/19</a:t>
             </a:fld>
             <a:endParaRPr lang="en-US"/>
           </a:p>
@@ -1202,7 +1202,7 @@
           <a:p>
             <a:fld id="{C9D44494-28C3-BB4E-9A33-83B3A960621F}" type="datetimeFigureOut">
               <a:rPr lang="en-US" smtClean="0"/>
-              <a:t>4/3/19</a:t>
+              <a:t>4/10/19</a:t>
             </a:fld>
             <a:endParaRPr lang="en-US"/>
           </a:p>
@@ -1446,7 +1446,7 @@
           <a:p>
             <a:fld id="{C9D44494-28C3-BB4E-9A33-83B3A960621F}" type="datetimeFigureOut">
               <a:rPr lang="en-US" smtClean="0"/>
-              <a:t>4/3/19</a:t>
+              <a:t>4/10/19</a:t>
             </a:fld>
             <a:endParaRPr lang="en-US"/>
           </a:p>
@@ -1678,7 +1678,7 @@
           <a:p>
             <a:fld id="{C9D44494-28C3-BB4E-9A33-83B3A960621F}" type="datetimeFigureOut">
               <a:rPr lang="en-US" smtClean="0"/>
-              <a:t>4/3/19</a:t>
+              <a:t>4/10/19</a:t>
             </a:fld>
             <a:endParaRPr lang="en-US"/>
           </a:p>
@@ -2045,7 +2045,7 @@
           <a:p>
             <a:fld id="{C9D44494-28C3-BB4E-9A33-83B3A960621F}" type="datetimeFigureOut">
               <a:rPr lang="en-US" smtClean="0"/>
-              <a:t>4/3/19</a:t>
+              <a:t>4/10/19</a:t>
             </a:fld>
             <a:endParaRPr lang="en-US"/>
           </a:p>
@@ -2163,7 +2163,7 @@
           <a:p>
             <a:fld id="{C9D44494-28C3-BB4E-9A33-83B3A960621F}" type="datetimeFigureOut">
               <a:rPr lang="en-US" smtClean="0"/>
-              <a:t>4/3/19</a:t>
+              <a:t>4/10/19</a:t>
             </a:fld>
             <a:endParaRPr lang="en-US"/>
           </a:p>
@@ -2258,7 +2258,7 @@
           <a:p>
             <a:fld id="{C9D44494-28C3-BB4E-9A33-83B3A960621F}" type="datetimeFigureOut">
               <a:rPr lang="en-US" smtClean="0"/>
-              <a:t>4/3/19</a:t>
+              <a:t>4/10/19</a:t>
             </a:fld>
             <a:endParaRPr lang="en-US"/>
           </a:p>
@@ -2535,7 +2535,7 @@
           <a:p>
             <a:fld id="{C9D44494-28C3-BB4E-9A33-83B3A960621F}" type="datetimeFigureOut">
               <a:rPr lang="en-US" smtClean="0"/>
-              <a:t>4/3/19</a:t>
+              <a:t>4/10/19</a:t>
             </a:fld>
             <a:endParaRPr lang="en-US"/>
           </a:p>
@@ -2792,7 +2792,7 @@
           <a:p>
             <a:fld id="{C9D44494-28C3-BB4E-9A33-83B3A960621F}" type="datetimeFigureOut">
               <a:rPr lang="en-US" smtClean="0"/>
-              <a:t>4/3/19</a:t>
+              <a:t>4/10/19</a:t>
             </a:fld>
             <a:endParaRPr lang="en-US"/>
           </a:p>
@@ -3005,7 +3005,7 @@
           <a:p>
             <a:fld id="{C9D44494-28C3-BB4E-9A33-83B3A960621F}" type="datetimeFigureOut">
               <a:rPr lang="en-US" smtClean="0"/>
-              <a:t>4/3/19</a:t>
+              <a:t>4/10/19</a:t>
             </a:fld>
             <a:endParaRPr lang="en-US"/>
           </a:p>
@@ -3485,10 +3485,10 @@
         </p:nvGrpSpPr>
         <p:grpSpPr>
           <a:xfrm>
-            <a:off x="1946155" y="4726008"/>
-            <a:ext cx="12801601" cy="9327511"/>
-            <a:chOff x="1859279" y="5293662"/>
-            <a:chExt cx="12801601" cy="9327511"/>
+            <a:off x="1946154" y="4782376"/>
+            <a:ext cx="12801600" cy="8311586"/>
+            <a:chOff x="1859278" y="5350030"/>
+            <a:chExt cx="12801600" cy="8311586"/>
           </a:xfrm>
         </p:grpSpPr>
         <p:sp>
@@ -3505,8 +3505,8 @@
           </p:nvSpPr>
           <p:spPr>
             <a:xfrm>
-              <a:off x="1859280" y="6540157"/>
-              <a:ext cx="12801600" cy="8081016"/>
+              <a:off x="1859278" y="6540157"/>
+              <a:ext cx="12801599" cy="7121459"/>
             </a:xfrm>
             <a:prstGeom prst="rect">
               <a:avLst/>
@@ -3564,8 +3564,8 @@
           </p:nvSpPr>
           <p:spPr>
             <a:xfrm>
-              <a:off x="1859279" y="5293662"/>
-              <a:ext cx="12801599" cy="1246495"/>
+              <a:off x="1859278" y="5350030"/>
+              <a:ext cx="12801600" cy="1246495"/>
             </a:xfrm>
             <a:prstGeom prst="rect">
               <a:avLst/>
@@ -3606,8 +3606,8 @@
         </p:nvSpPr>
         <p:spPr>
           <a:xfrm>
-            <a:off x="2374778" y="6107434"/>
-            <a:ext cx="12104627" cy="7632859"/>
+            <a:off x="2364263" y="6141673"/>
+            <a:ext cx="11766483" cy="6986528"/>
           </a:xfrm>
           <a:prstGeom prst="rect">
             <a:avLst/>
@@ -3620,37 +3620,42 @@
           </a:bodyPr>
           <a:lstStyle/>
           <a:p>
-            <a:r>
-              <a:rPr lang="en-US" sz="3500" dirty="0"/>
+            <a:pPr algn="just"/>
+            <a:r>
+              <a:rPr lang="en-US" sz="3200" dirty="0"/>
               <a:t>This project employed machine learning concepts and processes in an attempt to teach a computer an algorithm that outputs a cookie recipe that is comparable to human-made recipes.</a:t>
             </a:r>
           </a:p>
           <a:p>
-            <a:r>
-              <a:rPr lang="en-US" sz="3500" dirty="0"/>
+            <a:pPr algn="just"/>
+            <a:r>
+              <a:rPr lang="en-US" sz="3200" dirty="0"/>
               <a:t> </a:t>
             </a:r>
           </a:p>
           <a:p>
-            <a:r>
-              <a:rPr lang="en-US" sz="3500" dirty="0"/>
+            <a:pPr algn="just"/>
+            <a:r>
+              <a:rPr lang="en-US" sz="3200" dirty="0"/>
               <a:t>The process involved feeding the algorithms a data set of cookie recipes that included details such as ingredients, ratings, and calories. A second algorithm was used to construct instructions for a recipe once ingredients were selected based off of instructions from the dataset of recipes.</a:t>
             </a:r>
           </a:p>
           <a:p>
-            <a:endParaRPr lang="en-US" sz="3500" dirty="0"/>
-          </a:p>
-          <a:p>
-            <a:r>
-              <a:rPr lang="en-US" sz="3500" dirty="0"/>
+            <a:pPr algn="just"/>
+            <a:endParaRPr lang="en-US" sz="3200" dirty="0"/>
+          </a:p>
+          <a:p>
+            <a:pPr algn="just"/>
+            <a:r>
+              <a:rPr lang="en-US" sz="3200" dirty="0"/>
               <a:t>The recipes were gathered by scraping the website </a:t>
             </a:r>
             <a:r>
-              <a:rPr lang="en-US" sz="3500" dirty="0" err="1"/>
+              <a:rPr lang="en-US" sz="3200" dirty="0" err="1"/>
               <a:t>allrecipes.com</a:t>
             </a:r>
             <a:r>
-              <a:rPr lang="en-US" sz="3500" dirty="0"/>
+              <a:rPr lang="en-US" sz="3200" dirty="0"/>
               <a:t> for chocolate chip cookie recipes that were compiled in order to “teach” the computer to recognize tasty cookies by looking at things such as reviews, ingredients, and calories.</a:t>
             </a:r>
           </a:p>
@@ -3775,232 +3780,6 @@
       </p:grpSp>
       <p:grpSp>
         <p:nvGrpSpPr>
-          <p:cNvPr id="4" name="Group 3">
-            <a:extLst>
-              <a:ext uri="{FF2B5EF4-FFF2-40B4-BE49-F238E27FC236}">
-                <a16:creationId xmlns:a16="http://schemas.microsoft.com/office/drawing/2014/main" id="{99FD63C0-9AA3-2D40-BEEF-5B1412A12908}"/>
-              </a:ext>
-            </a:extLst>
-          </p:cNvPr>
-          <p:cNvGrpSpPr/>
-          <p:nvPr/>
-        </p:nvGrpSpPr>
-        <p:grpSpPr>
-          <a:xfrm>
-            <a:off x="1946155" y="14597865"/>
-            <a:ext cx="12801600" cy="16916676"/>
-            <a:chOff x="1920204" y="15350897"/>
-            <a:chExt cx="12801600" cy="16916676"/>
-          </a:xfrm>
-        </p:grpSpPr>
-        <p:grpSp>
-          <p:nvGrpSpPr>
-            <p:cNvPr id="44" name="Group 43">
-              <a:extLst>
-                <a:ext uri="{FF2B5EF4-FFF2-40B4-BE49-F238E27FC236}">
-                  <a16:creationId xmlns:a16="http://schemas.microsoft.com/office/drawing/2014/main" id="{42D418D0-1475-4C4A-ACE1-7DE005030BB9}"/>
-                </a:ext>
-              </a:extLst>
-            </p:cNvPr>
-            <p:cNvGrpSpPr/>
-            <p:nvPr/>
-          </p:nvGrpSpPr>
-          <p:grpSpPr>
-            <a:xfrm>
-              <a:off x="1920204" y="16593297"/>
-              <a:ext cx="12801600" cy="15674276"/>
-              <a:chOff x="2584244" y="18547360"/>
-              <a:chExt cx="12280123" cy="13680638"/>
-            </a:xfrm>
-          </p:grpSpPr>
-          <p:sp>
-            <p:nvSpPr>
-              <p:cNvPr id="31" name="Rectangle 30">
-                <a:extLst>
-                  <a:ext uri="{FF2B5EF4-FFF2-40B4-BE49-F238E27FC236}">
-                    <a16:creationId xmlns:a16="http://schemas.microsoft.com/office/drawing/2014/main" id="{EE9641F5-0AD5-6046-BF7C-E359F82E3EB7}"/>
-                  </a:ext>
-                </a:extLst>
-              </p:cNvPr>
-              <p:cNvSpPr/>
-              <p:nvPr/>
-            </p:nvSpPr>
-            <p:spPr>
-              <a:xfrm>
-                <a:off x="2584244" y="18547360"/>
-                <a:ext cx="12280123" cy="13680638"/>
-              </a:xfrm>
-              <a:prstGeom prst="rect">
-                <a:avLst/>
-              </a:prstGeom>
-              <a:solidFill>
-                <a:schemeClr val="accent3">
-                  <a:lumMod val="20000"/>
-                  <a:lumOff val="80000"/>
-                </a:schemeClr>
-              </a:solidFill>
-              <a:ln>
-                <a:noFill/>
-              </a:ln>
-            </p:spPr>
-            <p:style>
-              <a:lnRef idx="2">
-                <a:schemeClr val="accent1">
-                  <a:shade val="50000"/>
-                </a:schemeClr>
-              </a:lnRef>
-              <a:fillRef idx="1">
-                <a:schemeClr val="accent1"/>
-              </a:fillRef>
-              <a:effectRef idx="0">
-                <a:schemeClr val="accent1"/>
-              </a:effectRef>
-              <a:fontRef idx="minor">
-                <a:schemeClr val="lt1"/>
-              </a:fontRef>
-            </p:style>
-            <p:txBody>
-              <a:bodyPr rtlCol="0" anchor="ctr"/>
-              <a:lstStyle/>
-              <a:p>
-                <a:pPr algn="ctr"/>
-                <a:endParaRPr lang="en-US"/>
-              </a:p>
-            </p:txBody>
-          </p:sp>
-          <p:pic>
-            <p:nvPicPr>
-              <p:cNvPr id="21" name="Picture 20">
-                <a:extLst>
-                  <a:ext uri="{FF2B5EF4-FFF2-40B4-BE49-F238E27FC236}">
-                    <a16:creationId xmlns:a16="http://schemas.microsoft.com/office/drawing/2014/main" id="{18D14643-7F95-8D44-A145-0CB3C4684726}"/>
-                  </a:ext>
-                </a:extLst>
-              </p:cNvPr>
-              <p:cNvPicPr>
-                <a:picLocks noChangeAspect="1"/>
-              </p:cNvPicPr>
-              <p:nvPr/>
-            </p:nvPicPr>
-            <p:blipFill>
-              <a:blip r:embed="rId4"/>
-              <a:stretch>
-                <a:fillRect/>
-              </a:stretch>
-            </p:blipFill>
-            <p:spPr>
-              <a:xfrm rot="16200000">
-                <a:off x="8129361" y="20038933"/>
-                <a:ext cx="7236955" cy="5548186"/>
-              </a:xfrm>
-              <a:prstGeom prst="rect">
-                <a:avLst/>
-              </a:prstGeom>
-            </p:spPr>
-          </p:pic>
-          <p:pic>
-            <p:nvPicPr>
-              <p:cNvPr id="41" name="Picture 40" descr="A close up of a logo&#10;&#10;Description automatically generated">
-                <a:extLst>
-                  <a:ext uri="{FF2B5EF4-FFF2-40B4-BE49-F238E27FC236}">
-                    <a16:creationId xmlns:a16="http://schemas.microsoft.com/office/drawing/2014/main" id="{F99A1BE5-63E9-5744-BD54-BB17BAD96482}"/>
-                  </a:ext>
-                </a:extLst>
-              </p:cNvPr>
-              <p:cNvPicPr>
-                <a:picLocks noChangeAspect="1"/>
-              </p:cNvPicPr>
-              <p:nvPr/>
-            </p:nvPicPr>
-            <p:blipFill rotWithShape="1">
-              <a:blip r:embed="rId5"/>
-              <a:srcRect l="6779" r="1611" b="2650"/>
-              <a:stretch/>
-            </p:blipFill>
-            <p:spPr>
-              <a:xfrm>
-                <a:off x="2985321" y="19194544"/>
-                <a:ext cx="5452311" cy="4069948"/>
-              </a:xfrm>
-              <a:prstGeom prst="rect">
-                <a:avLst/>
-              </a:prstGeom>
-            </p:spPr>
-          </p:pic>
-          <p:pic>
-            <p:nvPicPr>
-              <p:cNvPr id="43" name="Picture 42" descr="A close up of a device&#10;&#10;Description automatically generated">
-                <a:extLst>
-                  <a:ext uri="{FF2B5EF4-FFF2-40B4-BE49-F238E27FC236}">
-                    <a16:creationId xmlns:a16="http://schemas.microsoft.com/office/drawing/2014/main" id="{2576297D-D30A-3541-8CC5-0402F5C54C7A}"/>
-                  </a:ext>
-                </a:extLst>
-              </p:cNvPr>
-              <p:cNvPicPr>
-                <a:picLocks noChangeAspect="1"/>
-              </p:cNvPicPr>
-              <p:nvPr/>
-            </p:nvPicPr>
-            <p:blipFill rotWithShape="1">
-              <a:blip r:embed="rId6"/>
-              <a:srcRect l="886" r="1023"/>
-              <a:stretch/>
-            </p:blipFill>
-            <p:spPr>
-              <a:xfrm>
-                <a:off x="2995407" y="23264492"/>
-                <a:ext cx="5442225" cy="3167007"/>
-              </a:xfrm>
-              <a:prstGeom prst="rect">
-                <a:avLst/>
-              </a:prstGeom>
-            </p:spPr>
-          </p:pic>
-        </p:grpSp>
-        <p:sp>
-          <p:nvSpPr>
-            <p:cNvPr id="3" name="TextBox 2">
-              <a:extLst>
-                <a:ext uri="{FF2B5EF4-FFF2-40B4-BE49-F238E27FC236}">
-                  <a16:creationId xmlns:a16="http://schemas.microsoft.com/office/drawing/2014/main" id="{DE71E852-4B7D-A043-A405-A93CF71DA78B}"/>
-                </a:ext>
-              </a:extLst>
-            </p:cNvPr>
-            <p:cNvSpPr txBox="1"/>
-            <p:nvPr/>
-          </p:nvSpPr>
-          <p:spPr>
-            <a:xfrm>
-              <a:off x="1920204" y="15350897"/>
-              <a:ext cx="12801598" cy="1246495"/>
-            </a:xfrm>
-            <a:prstGeom prst="rect">
-              <a:avLst/>
-            </a:prstGeom>
-            <a:solidFill>
-              <a:schemeClr val="accent4">
-                <a:lumMod val="20000"/>
-                <a:lumOff val="80000"/>
-              </a:schemeClr>
-            </a:solidFill>
-          </p:spPr>
-          <p:txBody>
-            <a:bodyPr wrap="square" rtlCol="0">
-              <a:spAutoFit/>
-            </a:bodyPr>
-            <a:lstStyle/>
-            <a:p>
-              <a:pPr algn="ctr"/>
-              <a:r>
-                <a:rPr lang="en-US" sz="7500" dirty="0"/>
-                <a:t>Diagrams of Networks</a:t>
-              </a:r>
-            </a:p>
-          </p:txBody>
-        </p:sp>
-      </p:grpSp>
-      <p:grpSp>
-        <p:nvGrpSpPr>
           <p:cNvPr id="5" name="Group 4">
             <a:extLst>
               <a:ext uri="{FF2B5EF4-FFF2-40B4-BE49-F238E27FC236}">
@@ -4013,10 +3792,10 @@
         </p:nvGrpSpPr>
         <p:grpSpPr>
           <a:xfrm>
-            <a:off x="15869841" y="4726008"/>
-            <a:ext cx="12801600" cy="21656807"/>
+            <a:off x="15577376" y="4646168"/>
+            <a:ext cx="12823319" cy="28236542"/>
             <a:chOff x="15869841" y="5618228"/>
-            <a:chExt cx="12801600" cy="22676886"/>
+            <a:chExt cx="12823319" cy="23456039"/>
           </a:xfrm>
         </p:grpSpPr>
         <p:grpSp>
@@ -4151,7 +3930,7 @@
           <p:spPr>
             <a:xfrm>
               <a:off x="16300274" y="6982458"/>
-              <a:ext cx="11944350" cy="4226997"/>
+              <a:ext cx="11944350" cy="2884347"/>
             </a:xfrm>
             <a:prstGeom prst="rect">
               <a:avLst/>
@@ -4171,26 +3950,19 @@
               </a:r>
             </a:p>
             <a:p>
-              <a:pPr algn="ctr"/>
+              <a:pPr algn="just"/>
               <a:r>
-                <a:rPr lang="en-US" sz="3500" dirty="0"/>
+                <a:rPr lang="en-US" sz="3200" dirty="0"/>
                 <a:t>Python scripts were employed to scrape over 250 chocolate chip cookie recipes from </a:t>
               </a:r>
               <a:r>
-                <a:rPr lang="en-US" sz="3500" dirty="0" err="1"/>
+                <a:rPr lang="en-US" sz="3200" dirty="0" err="1"/>
                 <a:t>allrecipes.com</a:t>
               </a:r>
               <a:r>
-                <a:rPr lang="en-US" sz="3500" dirty="0"/>
+                <a:rPr lang="en-US" sz="3200" dirty="0"/>
                 <a:t>. This data was then cleaned and inputted into two spreadsheets, one for ingredients and one for instructions,  for further use.</a:t>
               </a:r>
-            </a:p>
-            <a:p>
-              <a:pPr algn="ctr"/>
-              <a:endParaRPr lang="en-US" sz="3500" dirty="0"/>
-            </a:p>
-            <a:p>
-              <a:endParaRPr lang="en-US" sz="4000" dirty="0"/>
             </a:p>
           </p:txBody>
         </p:sp>
@@ -4209,7 +3981,7 @@
           <p:spPr>
             <a:xfrm>
               <a:off x="15869841" y="21276351"/>
-              <a:ext cx="12801600" cy="6300446"/>
+              <a:ext cx="12801600" cy="7797916"/>
             </a:xfrm>
             <a:prstGeom prst="rect">
               <a:avLst/>
@@ -4229,32 +4001,11 @@
               </a:r>
             </a:p>
             <a:p>
-              <a:pPr algn="ctr"/>
-              <a:endParaRPr lang="en-US" sz="4500" dirty="0"/>
-            </a:p>
-            <a:p>
-              <a:pPr algn="ctr"/>
-              <a:endParaRPr lang="en-US" sz="4500" dirty="0"/>
-            </a:p>
-            <a:p>
-              <a:pPr algn="ctr"/>
-              <a:endParaRPr lang="en-US" sz="4500" dirty="0"/>
-            </a:p>
-            <a:p>
-              <a:pPr algn="ctr"/>
-              <a:endParaRPr lang="en-US" sz="4500" dirty="0"/>
-            </a:p>
-            <a:p>
-              <a:pPr algn="ctr"/>
-              <a:endParaRPr lang="en-US" sz="3200" dirty="0"/>
-            </a:p>
-            <a:p>
-              <a:pPr algn="ctr"/>
-              <a:endParaRPr lang="en-US" sz="3200" dirty="0"/>
-            </a:p>
-            <a:p>
-              <a:pPr algn="ctr"/>
-              <a:endParaRPr lang="en-US" sz="3200" dirty="0"/>
+              <a:pPr algn="just"/>
+              <a:r>
+                <a:rPr lang="en-US" sz="4500" dirty="0"/>
+                <a:t>In order to get instructions unique to each generated recipe, we used a Long Short-Term Memory Recurrent Neural network, through which we fed in the generated recipe as an attention mechanism. The attention mechanism combined with the memory then trains the model to output a sequence of words that it believes are correct. The LSTM at each iteration outputs the word with the highest probability into a sequence and then feeds that outputted word back into the network as “memory”.</a:t>
+              </a:r>
             </a:p>
             <a:p>
               <a:pPr algn="ctr"/>
@@ -4283,8 +4034,8 @@
           </p:nvSpPr>
           <p:spPr>
             <a:xfrm>
-              <a:off x="15942141" y="9963262"/>
-              <a:ext cx="12729300" cy="11779094"/>
+              <a:off x="15963860" y="9820956"/>
+              <a:ext cx="12729300" cy="10844501"/>
             </a:xfrm>
             <a:prstGeom prst="rect">
               <a:avLst/>
@@ -4304,19 +4055,15 @@
               </a:r>
             </a:p>
             <a:p>
-              <a:pPr algn="ctr"/>
+              <a:pPr algn="just"/>
               <a:r>
                 <a:rPr lang="en-US" sz="4000" dirty="0"/>
                 <a:t> </a:t>
               </a:r>
               <a:r>
-                <a:rPr lang="en-US" sz="3000" dirty="0"/>
+                <a:rPr lang="en-US" sz="3200" dirty="0"/>
                 <a:t>We began by training 9 different machine learning algorithms. After analysis of recipes produced by each, we chose 5 recipes from 3 different algorithms.</a:t>
               </a:r>
-            </a:p>
-            <a:p>
-              <a:pPr algn="ctr"/>
-              <a:endParaRPr lang="en-US" sz="3000" dirty="0"/>
             </a:p>
             <a:p>
               <a:pPr algn="ctr"/>
@@ -4341,8 +4088,9 @@
               </a:r>
             </a:p>
             <a:p>
+              <a:pPr algn="just"/>
               <a:r>
-                <a:rPr lang="en-US" sz="3000" dirty="0"/>
+                <a:rPr lang="en-US" sz="3200" dirty="0"/>
                 <a:t>The algorithm is a variant of the Random Forest regression that picks a decision boundary at random by using the entire sample  at each step of the extreme tree.. It uses a plethora of decision trees and merges them to make a stable and accurate prediction.</a:t>
               </a:r>
             </a:p>
@@ -4364,17 +4112,11 @@
               </a:r>
             </a:p>
             <a:p>
+              <a:pPr algn="just"/>
               <a:r>
-                <a:rPr lang="en-US" sz="3000" dirty="0"/>
+                <a:rPr lang="en-US" sz="3200" dirty="0"/>
                 <a:t>The gradient boosting algorithm applies the concept of modifying a weak learner to become better at identifying good outcomes more efficiently. The model uses an ensemble of weak prediction models, typically decision trees, to make predictions. The gradient boosting algorithm attempts to minimize errors through a loss function. </a:t>
               </a:r>
-            </a:p>
-            <a:p>
-              <a:pPr algn="ctr"/>
-              <a:endParaRPr lang="en-US" sz="4000" dirty="0"/>
-            </a:p>
-            <a:p>
-              <a:pPr algn="ctr"/>
               <a:endParaRPr lang="en-US" sz="4000" dirty="0"/>
             </a:p>
           </p:txBody>
@@ -4568,7 +4310,7 @@
           <p:spPr>
             <a:xfrm>
               <a:off x="29230321" y="17596812"/>
-              <a:ext cx="12758162" cy="4145717"/>
+              <a:ext cx="12758162" cy="4372437"/>
             </a:xfrm>
             <a:prstGeom prst="rect">
               <a:avLst/>
@@ -4588,86 +4330,355 @@
               </a:r>
             </a:p>
             <a:p>
+              <a:pPr algn="just"/>
               <a:r>
-                <a:rPr lang="en-US" sz="3000" dirty="0"/>
+                <a:rPr lang="en-US" sz="3200" dirty="0"/>
                 <a:t>	As the vector-to-sequence algorithm is previously untested in other research, the end results leave something to desire in terms of ability to finesse and actual usability. However, it is an accomplishment to have gotten a working algorithm that takes in an ingredient vector and outputs a semi-usable recipe. Improvements include ensuring that the instructions contain all ingredients in the vector that contain non-zero values and eliminating repeating loops that the algorithm gets stuck on.</a:t>
               </a:r>
             </a:p>
           </p:txBody>
         </p:sp>
       </p:grpSp>
-      <p:sp>
-        <p:nvSpPr>
-          <p:cNvPr id="22" name="TextBox 21">
+      <p:grpSp>
+        <p:nvGrpSpPr>
+          <p:cNvPr id="46" name="Group 45">
             <a:extLst>
               <a:ext uri="{FF2B5EF4-FFF2-40B4-BE49-F238E27FC236}">
-                <a16:creationId xmlns:a16="http://schemas.microsoft.com/office/drawing/2014/main" id="{EF2BDDCA-58DB-474C-AE9F-6C98F1729B61}"/>
+                <a16:creationId xmlns:a16="http://schemas.microsoft.com/office/drawing/2014/main" id="{F8DA5339-B77E-A24C-A88D-9B84B75CD1B1}"/>
               </a:ext>
             </a:extLst>
           </p:cNvPr>
-          <p:cNvSpPr txBox="1"/>
+          <p:cNvGrpSpPr/>
           <p:nvPr/>
-        </p:nvSpPr>
-        <p:spPr>
+        </p:nvGrpSpPr>
+        <p:grpSpPr>
           <a:xfrm>
-            <a:off x="3158573" y="24265551"/>
-            <a:ext cx="5229388" cy="553998"/>
+            <a:off x="1946155" y="13300470"/>
+            <a:ext cx="12801600" cy="15841661"/>
+            <a:chOff x="1946155" y="13620510"/>
+            <a:chExt cx="12801600" cy="15841661"/>
           </a:xfrm>
-          <a:prstGeom prst="rect">
-            <a:avLst/>
-          </a:prstGeom>
-          <a:noFill/>
-        </p:spPr>
-        <p:txBody>
-          <a:bodyPr wrap="square" rtlCol="0">
-            <a:spAutoFit/>
-          </a:bodyPr>
-          <a:lstStyle/>
-          <a:p>
-            <a:pPr algn="l"/>
-            <a:r>
-              <a:rPr lang="en-US" sz="2900" dirty="0"/>
-              <a:t>Deep Learning Neural Network</a:t>
-            </a:r>
-          </a:p>
-        </p:txBody>
-      </p:sp>
-      <p:sp>
-        <p:nvSpPr>
-          <p:cNvPr id="35" name="TextBox 34">
-            <a:extLst>
-              <a:ext uri="{FF2B5EF4-FFF2-40B4-BE49-F238E27FC236}">
-                <a16:creationId xmlns:a16="http://schemas.microsoft.com/office/drawing/2014/main" id="{71152A89-DB9C-C14B-B0DC-56AE2ECD772E}"/>
-              </a:ext>
-            </a:extLst>
-          </p:cNvPr>
-          <p:cNvSpPr txBox="1"/>
-          <p:nvPr/>
-        </p:nvSpPr>
-        <p:spPr>
-          <a:xfrm>
-            <a:off x="8679722" y="24319339"/>
-            <a:ext cx="5961048" cy="553998"/>
-          </a:xfrm>
-          <a:prstGeom prst="rect">
-            <a:avLst/>
-          </a:prstGeom>
-          <a:noFill/>
-        </p:spPr>
-        <p:txBody>
-          <a:bodyPr wrap="square" rtlCol="0">
-            <a:spAutoFit/>
-          </a:bodyPr>
-          <a:lstStyle/>
-          <a:p>
-            <a:pPr algn="l"/>
-            <a:r>
-              <a:rPr lang="en-US" sz="2900" dirty="0"/>
-              <a:t>Extreme Trees and Gradient Boosting</a:t>
-            </a:r>
-          </a:p>
-        </p:txBody>
-      </p:sp>
+        </p:grpSpPr>
+        <p:grpSp>
+          <p:nvGrpSpPr>
+            <p:cNvPr id="45" name="Group 44">
+              <a:extLst>
+                <a:ext uri="{FF2B5EF4-FFF2-40B4-BE49-F238E27FC236}">
+                  <a16:creationId xmlns:a16="http://schemas.microsoft.com/office/drawing/2014/main" id="{730BFFD3-C287-A446-A8AD-C9BF07F3E4E8}"/>
+                </a:ext>
+              </a:extLst>
+            </p:cNvPr>
+            <p:cNvGrpSpPr/>
+            <p:nvPr/>
+          </p:nvGrpSpPr>
+          <p:grpSpPr>
+            <a:xfrm>
+              <a:off x="1946155" y="13620510"/>
+              <a:ext cx="12801600" cy="15841661"/>
+              <a:chOff x="1946155" y="14597865"/>
+              <a:chExt cx="12801600" cy="15841661"/>
+            </a:xfrm>
+          </p:grpSpPr>
+          <p:grpSp>
+            <p:nvGrpSpPr>
+              <p:cNvPr id="4" name="Group 3">
+                <a:extLst>
+                  <a:ext uri="{FF2B5EF4-FFF2-40B4-BE49-F238E27FC236}">
+                    <a16:creationId xmlns:a16="http://schemas.microsoft.com/office/drawing/2014/main" id="{99FD63C0-9AA3-2D40-BEEF-5B1412A12908}"/>
+                  </a:ext>
+                </a:extLst>
+              </p:cNvPr>
+              <p:cNvGrpSpPr/>
+              <p:nvPr/>
+            </p:nvGrpSpPr>
+            <p:grpSpPr>
+              <a:xfrm>
+                <a:off x="1946155" y="14597865"/>
+                <a:ext cx="12801600" cy="15841661"/>
+                <a:chOff x="1920204" y="15350897"/>
+                <a:chExt cx="12801600" cy="15841661"/>
+              </a:xfrm>
+            </p:grpSpPr>
+            <p:grpSp>
+              <p:nvGrpSpPr>
+                <p:cNvPr id="44" name="Group 43">
+                  <a:extLst>
+                    <a:ext uri="{FF2B5EF4-FFF2-40B4-BE49-F238E27FC236}">
+                      <a16:creationId xmlns:a16="http://schemas.microsoft.com/office/drawing/2014/main" id="{42D418D0-1475-4C4A-ACE1-7DE005030BB9}"/>
+                    </a:ext>
+                  </a:extLst>
+                </p:cNvPr>
+                <p:cNvGrpSpPr/>
+                <p:nvPr/>
+              </p:nvGrpSpPr>
+              <p:grpSpPr>
+                <a:xfrm>
+                  <a:off x="1920204" y="16593297"/>
+                  <a:ext cx="12801600" cy="14599261"/>
+                  <a:chOff x="2584244" y="18547360"/>
+                  <a:chExt cx="12280123" cy="12742356"/>
+                </a:xfrm>
+              </p:grpSpPr>
+              <p:sp>
+                <p:nvSpPr>
+                  <p:cNvPr id="31" name="Rectangle 30">
+                    <a:extLst>
+                      <a:ext uri="{FF2B5EF4-FFF2-40B4-BE49-F238E27FC236}">
+                        <a16:creationId xmlns:a16="http://schemas.microsoft.com/office/drawing/2014/main" id="{EE9641F5-0AD5-6046-BF7C-E359F82E3EB7}"/>
+                      </a:ext>
+                    </a:extLst>
+                  </p:cNvPr>
+                  <p:cNvSpPr/>
+                  <p:nvPr/>
+                </p:nvSpPr>
+                <p:spPr>
+                  <a:xfrm>
+                    <a:off x="2584244" y="18547360"/>
+                    <a:ext cx="12280123" cy="12742356"/>
+                  </a:xfrm>
+                  <a:prstGeom prst="rect">
+                    <a:avLst/>
+                  </a:prstGeom>
+                  <a:solidFill>
+                    <a:schemeClr val="accent3">
+                      <a:lumMod val="20000"/>
+                      <a:lumOff val="80000"/>
+                    </a:schemeClr>
+                  </a:solidFill>
+                  <a:ln>
+                    <a:noFill/>
+                  </a:ln>
+                </p:spPr>
+                <p:style>
+                  <a:lnRef idx="2">
+                    <a:schemeClr val="accent1">
+                      <a:shade val="50000"/>
+                    </a:schemeClr>
+                  </a:lnRef>
+                  <a:fillRef idx="1">
+                    <a:schemeClr val="accent1"/>
+                  </a:fillRef>
+                  <a:effectRef idx="0">
+                    <a:schemeClr val="accent1"/>
+                  </a:effectRef>
+                  <a:fontRef idx="minor">
+                    <a:schemeClr val="lt1"/>
+                  </a:fontRef>
+                </p:style>
+                <p:txBody>
+                  <a:bodyPr rtlCol="0" anchor="ctr"/>
+                  <a:lstStyle/>
+                  <a:p>
+                    <a:pPr algn="ctr"/>
+                    <a:endParaRPr lang="en-US"/>
+                  </a:p>
+                </p:txBody>
+              </p:sp>
+              <p:pic>
+                <p:nvPicPr>
+                  <p:cNvPr id="21" name="Picture 20">
+                    <a:extLst>
+                      <a:ext uri="{FF2B5EF4-FFF2-40B4-BE49-F238E27FC236}">
+                        <a16:creationId xmlns:a16="http://schemas.microsoft.com/office/drawing/2014/main" id="{18D14643-7F95-8D44-A145-0CB3C4684726}"/>
+                      </a:ext>
+                    </a:extLst>
+                  </p:cNvPr>
+                  <p:cNvPicPr>
+                    <a:picLocks noChangeAspect="1"/>
+                  </p:cNvPicPr>
+                  <p:nvPr/>
+                </p:nvPicPr>
+                <p:blipFill>
+                  <a:blip r:embed="rId4"/>
+                  <a:stretch>
+                    <a:fillRect/>
+                  </a:stretch>
+                </p:blipFill>
+                <p:spPr>
+                  <a:xfrm rot="16200000">
+                    <a:off x="7875195" y="19698682"/>
+                    <a:ext cx="7246409" cy="5548186"/>
+                  </a:xfrm>
+                  <a:prstGeom prst="rect">
+                    <a:avLst/>
+                  </a:prstGeom>
+                </p:spPr>
+              </p:pic>
+              <p:pic>
+                <p:nvPicPr>
+                  <p:cNvPr id="41" name="Picture 40" descr="A close up of a logo&#10;&#10;Description automatically generated">
+                    <a:extLst>
+                      <a:ext uri="{FF2B5EF4-FFF2-40B4-BE49-F238E27FC236}">
+                        <a16:creationId xmlns:a16="http://schemas.microsoft.com/office/drawing/2014/main" id="{F99A1BE5-63E9-5744-BD54-BB17BAD96482}"/>
+                      </a:ext>
+                    </a:extLst>
+                  </p:cNvPr>
+                  <p:cNvPicPr>
+                    <a:picLocks noChangeAspect="1"/>
+                  </p:cNvPicPr>
+                  <p:nvPr/>
+                </p:nvPicPr>
+                <p:blipFill rotWithShape="1">
+                  <a:blip r:embed="rId5"/>
+                  <a:srcRect l="6779" r="1611" b="2650"/>
+                  <a:stretch/>
+                </p:blipFill>
+                <p:spPr>
+                  <a:xfrm>
+                    <a:off x="2985321" y="18842267"/>
+                    <a:ext cx="5452311" cy="4069948"/>
+                  </a:xfrm>
+                  <a:prstGeom prst="rect">
+                    <a:avLst/>
+                  </a:prstGeom>
+                </p:spPr>
+              </p:pic>
+              <p:pic>
+                <p:nvPicPr>
+                  <p:cNvPr id="43" name="Picture 42" descr="A close up of a device&#10;&#10;Description automatically generated">
+                    <a:extLst>
+                      <a:ext uri="{FF2B5EF4-FFF2-40B4-BE49-F238E27FC236}">
+                        <a16:creationId xmlns:a16="http://schemas.microsoft.com/office/drawing/2014/main" id="{2576297D-D30A-3541-8CC5-0402F5C54C7A}"/>
+                      </a:ext>
+                    </a:extLst>
+                  </p:cNvPr>
+                  <p:cNvPicPr>
+                    <a:picLocks noChangeAspect="1"/>
+                  </p:cNvPicPr>
+                  <p:nvPr/>
+                </p:nvPicPr>
+                <p:blipFill rotWithShape="1">
+                  <a:blip r:embed="rId6"/>
+                  <a:srcRect l="886" r="1023"/>
+                  <a:stretch/>
+                </p:blipFill>
+                <p:spPr>
+                  <a:xfrm>
+                    <a:off x="2995407" y="22912215"/>
+                    <a:ext cx="5442225" cy="3167007"/>
+                  </a:xfrm>
+                  <a:prstGeom prst="rect">
+                    <a:avLst/>
+                  </a:prstGeom>
+                </p:spPr>
+              </p:pic>
+            </p:grpSp>
+            <p:sp>
+              <p:nvSpPr>
+                <p:cNvPr id="3" name="TextBox 2">
+                  <a:extLst>
+                    <a:ext uri="{FF2B5EF4-FFF2-40B4-BE49-F238E27FC236}">
+                      <a16:creationId xmlns:a16="http://schemas.microsoft.com/office/drawing/2014/main" id="{DE71E852-4B7D-A043-A405-A93CF71DA78B}"/>
+                    </a:ext>
+                  </a:extLst>
+                </p:cNvPr>
+                <p:cNvSpPr txBox="1"/>
+                <p:nvPr/>
+              </p:nvSpPr>
+              <p:spPr>
+                <a:xfrm>
+                  <a:off x="1920204" y="15350897"/>
+                  <a:ext cx="12801598" cy="1246495"/>
+                </a:xfrm>
+                <a:prstGeom prst="rect">
+                  <a:avLst/>
+                </a:prstGeom>
+                <a:solidFill>
+                  <a:schemeClr val="accent4">
+                    <a:lumMod val="20000"/>
+                    <a:lumOff val="80000"/>
+                  </a:schemeClr>
+                </a:solidFill>
+              </p:spPr>
+              <p:txBody>
+                <a:bodyPr wrap="square" rtlCol="0">
+                  <a:spAutoFit/>
+                </a:bodyPr>
+                <a:lstStyle/>
+                <a:p>
+                  <a:pPr algn="ctr"/>
+                  <a:r>
+                    <a:rPr lang="en-US" sz="7500" dirty="0"/>
+                    <a:t>Diagrams of Networks</a:t>
+                  </a:r>
+                </a:p>
+              </p:txBody>
+            </p:sp>
+          </p:grpSp>
+          <p:sp>
+            <p:nvSpPr>
+              <p:cNvPr id="22" name="TextBox 21">
+                <a:extLst>
+                  <a:ext uri="{FF2B5EF4-FFF2-40B4-BE49-F238E27FC236}">
+                    <a16:creationId xmlns:a16="http://schemas.microsoft.com/office/drawing/2014/main" id="{EF2BDDCA-58DB-474C-AE9F-6C98F1729B61}"/>
+                  </a:ext>
+                </a:extLst>
+              </p:cNvPr>
+              <p:cNvSpPr txBox="1"/>
+              <p:nvPr/>
+            </p:nvSpPr>
+            <p:spPr>
+              <a:xfrm>
+                <a:off x="3117566" y="23920705"/>
+                <a:ext cx="5229388" cy="553998"/>
+              </a:xfrm>
+              <a:prstGeom prst="rect">
+                <a:avLst/>
+              </a:prstGeom>
+              <a:noFill/>
+            </p:spPr>
+            <p:txBody>
+              <a:bodyPr wrap="square" rtlCol="0">
+                <a:spAutoFit/>
+              </a:bodyPr>
+              <a:lstStyle/>
+              <a:p>
+                <a:pPr algn="l"/>
+                <a:r>
+                  <a:rPr lang="en-US" sz="2900" dirty="0"/>
+                  <a:t>Deep Learning Neural Network</a:t>
+                </a:r>
+              </a:p>
+            </p:txBody>
+          </p:sp>
+        </p:grpSp>
+        <p:sp>
+          <p:nvSpPr>
+            <p:cNvPr id="35" name="TextBox 34">
+              <a:extLst>
+                <a:ext uri="{FF2B5EF4-FFF2-40B4-BE49-F238E27FC236}">
+                  <a16:creationId xmlns:a16="http://schemas.microsoft.com/office/drawing/2014/main" id="{71152A89-DB9C-C14B-B0DC-56AE2ECD772E}"/>
+                </a:ext>
+              </a:extLst>
+            </p:cNvPr>
+            <p:cNvSpPr txBox="1"/>
+            <p:nvPr/>
+          </p:nvSpPr>
+          <p:spPr>
+            <a:xfrm>
+              <a:off x="8449139" y="22938369"/>
+              <a:ext cx="5961048" cy="553998"/>
+            </a:xfrm>
+            <a:prstGeom prst="rect">
+              <a:avLst/>
+            </a:prstGeom>
+            <a:noFill/>
+          </p:spPr>
+          <p:txBody>
+            <a:bodyPr wrap="square" rtlCol="0">
+              <a:spAutoFit/>
+            </a:bodyPr>
+            <a:lstStyle/>
+            <a:p>
+              <a:pPr algn="l"/>
+              <a:r>
+                <a:rPr lang="en-US" sz="2900" dirty="0"/>
+                <a:t>Extreme Trees and Gradient Boosting</a:t>
+              </a:r>
+            </a:p>
+          </p:txBody>
+        </p:sp>
+      </p:grpSp>
       <p:grpSp>
         <p:nvGrpSpPr>
           <p:cNvPr id="27" name="Group 26">
@@ -4682,10 +4693,10 @@
         </p:nvGrpSpPr>
         <p:grpSpPr>
           <a:xfrm>
-            <a:off x="29230323" y="26984242"/>
-            <a:ext cx="13277929" cy="4530299"/>
+            <a:off x="2048338" y="29352779"/>
+            <a:ext cx="12801601" cy="2649636"/>
             <a:chOff x="33797164" y="27737274"/>
-            <a:chExt cx="8541159" cy="4530299"/>
+            <a:chExt cx="8234756" cy="2649636"/>
           </a:xfrm>
         </p:grpSpPr>
         <p:sp>
@@ -4702,8 +4713,8 @@
           </p:nvSpPr>
           <p:spPr>
             <a:xfrm>
-              <a:off x="33797164" y="28983768"/>
-              <a:ext cx="8234756" cy="3283805"/>
+              <a:off x="33797164" y="28586209"/>
+              <a:ext cx="8234756" cy="1800701"/>
             </a:xfrm>
             <a:prstGeom prst="rect">
               <a:avLst/>
@@ -4758,7 +4769,7 @@
           <p:spPr>
             <a:xfrm>
               <a:off x="33797164" y="27737274"/>
-              <a:ext cx="8234756" cy="1246495"/>
+              <a:ext cx="8234756" cy="861774"/>
             </a:xfrm>
             <a:prstGeom prst="rect">
               <a:avLst/>
@@ -4778,7 +4789,7 @@
             <a:p>
               <a:pPr algn="ctr"/>
               <a:r>
-                <a:rPr lang="en-US" sz="7500" dirty="0"/>
+                <a:rPr lang="en-US" sz="5000" dirty="0"/>
                 <a:t>References</a:t>
               </a:r>
             </a:p>
@@ -4798,8 +4809,8 @@
           </p:nvSpPr>
           <p:spPr>
             <a:xfrm>
-              <a:off x="34159451" y="29648005"/>
-              <a:ext cx="8178872" cy="1938992"/>
+              <a:off x="33853046" y="28698040"/>
+              <a:ext cx="8178872" cy="1631216"/>
             </a:xfrm>
             <a:prstGeom prst="rect">
               <a:avLst/>
@@ -4812,34 +4823,38 @@
             </a:bodyPr>
             <a:lstStyle/>
             <a:p>
+              <a:pPr algn="just"/>
               <a:r>
-                <a:rPr lang="en-US" sz="3000" dirty="0"/>
+                <a:rPr lang="en-US" sz="2500" dirty="0"/>
                 <a:t>Clifford, Catherine. “Alphabet Billionaire Eric Schmidt: Google Used A.I. to</a:t>
               </a:r>
             </a:p>
             <a:p>
+              <a:pPr algn="just"/>
               <a:r>
-                <a:rPr lang="en-US" sz="3000" dirty="0"/>
+                <a:rPr lang="en-US" sz="2500" dirty="0"/>
                 <a:t>	 Find the Perfect Chocolate Chip Cookie Recipe.” CNBC, CNBC, 29 Jan. 2018.</a:t>
               </a:r>
             </a:p>
             <a:p>
+              <a:pPr algn="just"/>
               <a:r>
-                <a:rPr lang="en-US" sz="3000" dirty="0"/>
+                <a:rPr lang="en-US" sz="2500" dirty="0"/>
                 <a:t>Kochanski, Greg et al. “Bayesian Optimization for a Better Dessert.” (2017).</a:t>
               </a:r>
             </a:p>
             <a:p>
+              <a:pPr algn="just"/>
               <a:r>
-                <a:rPr lang="en-US" sz="3000" dirty="0"/>
+                <a:rPr lang="en-US" sz="2500" dirty="0"/>
                 <a:t>Naik, </a:t>
               </a:r>
               <a:r>
-                <a:rPr lang="en-US" sz="3000" dirty="0" err="1"/>
+                <a:rPr lang="en-US" sz="2500" dirty="0" err="1"/>
                 <a:t>JitendraB</a:t>
               </a:r>
               <a:r>
-                <a:rPr lang="en-US" sz="3000" dirty="0"/>
+                <a:rPr lang="en-US" sz="2500" dirty="0"/>
                 <a:t>.. “Cuisine Classification and Recipe Generation.” (2015).</a:t>
               </a:r>
             </a:p>
@@ -4860,7 +4875,7 @@
         </p:nvGrpSpPr>
         <p:grpSpPr>
           <a:xfrm>
-            <a:off x="15869841" y="26686328"/>
+            <a:off x="29230320" y="27369559"/>
             <a:ext cx="12801600" cy="4828213"/>
             <a:chOff x="15905991" y="26700239"/>
             <a:chExt cx="12801600" cy="4828213"/>
@@ -5011,7 +5026,7 @@
             </a:bodyPr>
             <a:lstStyle/>
             <a:p>
-              <a:pPr marL="457200" indent="-457200">
+              <a:pPr marL="457200" indent="-457200" algn="just">
                 <a:buFont typeface="Arial" panose="020B0604020202020204" pitchFamily="34" charset="0"/>
                 <a:buChar char="•"/>
               </a:pPr>
@@ -5021,7 +5036,7 @@
               </a:r>
             </a:p>
             <a:p>
-              <a:pPr marL="457200" indent="-457200">
+              <a:pPr marL="457200" indent="-457200" algn="just">
                 <a:buFont typeface="Arial" panose="020B0604020202020204" pitchFamily="34" charset="0"/>
                 <a:buChar char="•"/>
               </a:pPr>
@@ -5031,7 +5046,7 @@
               </a:r>
             </a:p>
             <a:p>
-              <a:pPr marL="457200" indent="-457200">
+              <a:pPr marL="457200" indent="-457200" algn="just">
                 <a:buFont typeface="Arial" panose="020B0604020202020204" pitchFamily="34" charset="0"/>
                 <a:buChar char="•"/>
               </a:pPr>
@@ -5041,7 +5056,7 @@
               </a:r>
             </a:p>
             <a:p>
-              <a:pPr marL="457200" indent="-457200">
+              <a:pPr marL="457200" indent="-457200" algn="just">
                 <a:buFont typeface="Arial" panose="020B0604020202020204" pitchFamily="34" charset="0"/>
                 <a:buChar char="•"/>
               </a:pPr>
@@ -5051,7 +5066,7 @@
               </a:r>
             </a:p>
             <a:p>
-              <a:pPr marL="457200" indent="-457200">
+              <a:pPr marL="457200" indent="-457200" algn="just">
                 <a:buFont typeface="Arial" panose="020B0604020202020204" pitchFamily="34" charset="0"/>
                 <a:buChar char="•"/>
               </a:pPr>
@@ -5063,12 +5078,42 @@
           </p:txBody>
         </p:sp>
       </p:grpSp>
-      <p:sp>
-        <p:nvSpPr>
-          <p:cNvPr id="42" name="TextBox 41">
+      <p:pic>
+        <p:nvPicPr>
+          <p:cNvPr id="53" name="Picture 52" descr="A close up of a sign&#10;&#10;Description automatically generated">
             <a:extLst>
               <a:ext uri="{FF2B5EF4-FFF2-40B4-BE49-F238E27FC236}">
-                <a16:creationId xmlns:a16="http://schemas.microsoft.com/office/drawing/2014/main" id="{1A66692B-F1AD-4747-8B2B-3A338D8CD3AC}"/>
+                <a16:creationId xmlns:a16="http://schemas.microsoft.com/office/drawing/2014/main" id="{DD519B94-0650-B44A-87FD-0A6943731C9F}"/>
+              </a:ext>
+            </a:extLst>
+          </p:cNvPr>
+          <p:cNvPicPr>
+            <a:picLocks noChangeAspect="1"/>
+          </p:cNvPicPr>
+          <p:nvPr/>
+        </p:nvPicPr>
+        <p:blipFill>
+          <a:blip r:embed="rId7"/>
+          <a:stretch>
+            <a:fillRect/>
+          </a:stretch>
+        </p:blipFill>
+        <p:spPr>
+          <a:xfrm>
+            <a:off x="2374778" y="23434431"/>
+            <a:ext cx="11755968" cy="4701593"/>
+          </a:xfrm>
+          <a:prstGeom prst="rect">
+            <a:avLst/>
+          </a:prstGeom>
+        </p:spPr>
+      </p:pic>
+      <p:sp>
+        <p:nvSpPr>
+          <p:cNvPr id="54" name="TextBox 53">
+            <a:extLst>
+              <a:ext uri="{FF2B5EF4-FFF2-40B4-BE49-F238E27FC236}">
+                <a16:creationId xmlns:a16="http://schemas.microsoft.com/office/drawing/2014/main" id="{2E854200-F4A8-5343-A81F-725004B1C30E}"/>
               </a:ext>
             </a:extLst>
           </p:cNvPr>
@@ -5077,7 +5122,7 @@
         </p:nvSpPr>
         <p:spPr>
           <a:xfrm>
-            <a:off x="5812397" y="30279967"/>
+            <a:off x="3263185" y="27503803"/>
             <a:ext cx="5229388" cy="553998"/>
           </a:xfrm>
           <a:prstGeom prst="rect">
@@ -5094,8 +5139,13 @@
             <a:pPr algn="l"/>
             <a:r>
               <a:rPr lang="en-US" sz="2900" dirty="0"/>
-              <a:t>LSTM Recurrent Neural Network</a:t>
-            </a:r>
+              <a:t>LSTM Recurrent </a:t>
+            </a:r>
+            <a:r>
+              <a:rPr lang="en-US" sz="2900"/>
+              <a:t>Neural Network</a:t>
+            </a:r>
+            <a:endParaRPr lang="en-US" sz="2900" dirty="0"/>
           </a:p>
         </p:txBody>
       </p:sp>

</xml_diff>

<commit_message>
finished 1st draft of poster
</commit_message>
<xml_diff>
--- a/ThesisPoster.pptx
+++ b/ThesisPoster.pptx
@@ -197,7 +197,7 @@
           <a:p>
             <a:fld id="{4F3C5630-2B26-2E4F-A71D-2F7761DC7C75}" type="datetimeFigureOut">
               <a:rPr lang="en-US" smtClean="0"/>
-              <a:t>4/10/19</a:t>
+              <a:t>4/12/19</a:t>
             </a:fld>
             <a:endParaRPr lang="en-US"/>
           </a:p>
@@ -682,7 +682,7 @@
           <a:p>
             <a:fld id="{C9D44494-28C3-BB4E-9A33-83B3A960621F}" type="datetimeFigureOut">
               <a:rPr lang="en-US" smtClean="0"/>
-              <a:t>4/10/19</a:t>
+              <a:t>4/12/19</a:t>
             </a:fld>
             <a:endParaRPr lang="en-US"/>
           </a:p>
@@ -852,7 +852,7 @@
           <a:p>
             <a:fld id="{C9D44494-28C3-BB4E-9A33-83B3A960621F}" type="datetimeFigureOut">
               <a:rPr lang="en-US" smtClean="0"/>
-              <a:t>4/10/19</a:t>
+              <a:t>4/12/19</a:t>
             </a:fld>
             <a:endParaRPr lang="en-US"/>
           </a:p>
@@ -1032,7 +1032,7 @@
           <a:p>
             <a:fld id="{C9D44494-28C3-BB4E-9A33-83B3A960621F}" type="datetimeFigureOut">
               <a:rPr lang="en-US" smtClean="0"/>
-              <a:t>4/10/19</a:t>
+              <a:t>4/12/19</a:t>
             </a:fld>
             <a:endParaRPr lang="en-US"/>
           </a:p>
@@ -1202,7 +1202,7 @@
           <a:p>
             <a:fld id="{C9D44494-28C3-BB4E-9A33-83B3A960621F}" type="datetimeFigureOut">
               <a:rPr lang="en-US" smtClean="0"/>
-              <a:t>4/10/19</a:t>
+              <a:t>4/12/19</a:t>
             </a:fld>
             <a:endParaRPr lang="en-US"/>
           </a:p>
@@ -1446,7 +1446,7 @@
           <a:p>
             <a:fld id="{C9D44494-28C3-BB4E-9A33-83B3A960621F}" type="datetimeFigureOut">
               <a:rPr lang="en-US" smtClean="0"/>
-              <a:t>4/10/19</a:t>
+              <a:t>4/12/19</a:t>
             </a:fld>
             <a:endParaRPr lang="en-US"/>
           </a:p>
@@ -1678,7 +1678,7 @@
           <a:p>
             <a:fld id="{C9D44494-28C3-BB4E-9A33-83B3A960621F}" type="datetimeFigureOut">
               <a:rPr lang="en-US" smtClean="0"/>
-              <a:t>4/10/19</a:t>
+              <a:t>4/12/19</a:t>
             </a:fld>
             <a:endParaRPr lang="en-US"/>
           </a:p>
@@ -2045,7 +2045,7 @@
           <a:p>
             <a:fld id="{C9D44494-28C3-BB4E-9A33-83B3A960621F}" type="datetimeFigureOut">
               <a:rPr lang="en-US" smtClean="0"/>
-              <a:t>4/10/19</a:t>
+              <a:t>4/12/19</a:t>
             </a:fld>
             <a:endParaRPr lang="en-US"/>
           </a:p>
@@ -2163,7 +2163,7 @@
           <a:p>
             <a:fld id="{C9D44494-28C3-BB4E-9A33-83B3A960621F}" type="datetimeFigureOut">
               <a:rPr lang="en-US" smtClean="0"/>
-              <a:t>4/10/19</a:t>
+              <a:t>4/12/19</a:t>
             </a:fld>
             <a:endParaRPr lang="en-US"/>
           </a:p>
@@ -2258,7 +2258,7 @@
           <a:p>
             <a:fld id="{C9D44494-28C3-BB4E-9A33-83B3A960621F}" type="datetimeFigureOut">
               <a:rPr lang="en-US" smtClean="0"/>
-              <a:t>4/10/19</a:t>
+              <a:t>4/12/19</a:t>
             </a:fld>
             <a:endParaRPr lang="en-US"/>
           </a:p>
@@ -2535,7 +2535,7 @@
           <a:p>
             <a:fld id="{C9D44494-28C3-BB4E-9A33-83B3A960621F}" type="datetimeFigureOut">
               <a:rPr lang="en-US" smtClean="0"/>
-              <a:t>4/10/19</a:t>
+              <a:t>4/12/19</a:t>
             </a:fld>
             <a:endParaRPr lang="en-US"/>
           </a:p>
@@ -2792,7 +2792,7 @@
           <a:p>
             <a:fld id="{C9D44494-28C3-BB4E-9A33-83B3A960621F}" type="datetimeFigureOut">
               <a:rPr lang="en-US" smtClean="0"/>
-              <a:t>4/10/19</a:t>
+              <a:t>4/12/19</a:t>
             </a:fld>
             <a:endParaRPr lang="en-US"/>
           </a:p>
@@ -3005,7 +3005,7 @@
           <a:p>
             <a:fld id="{C9D44494-28C3-BB4E-9A33-83B3A960621F}" type="datetimeFigureOut">
               <a:rPr lang="en-US" smtClean="0"/>
-              <a:t>4/10/19</a:t>
+              <a:t>4/12/19</a:t>
             </a:fld>
             <a:endParaRPr lang="en-US"/>
           </a:p>
@@ -3423,54 +3423,6 @@
           <a:chExt cx="0" cy="0"/>
         </a:xfrm>
       </p:grpSpPr>
-      <p:sp>
-        <p:nvSpPr>
-          <p:cNvPr id="2" name="Title 1">
-            <a:extLst>
-              <a:ext uri="{FF2B5EF4-FFF2-40B4-BE49-F238E27FC236}">
-                <a16:creationId xmlns:a16="http://schemas.microsoft.com/office/drawing/2014/main" id="{1F00097D-A931-BC4A-9611-308BE1ECFA55}"/>
-              </a:ext>
-            </a:extLst>
-          </p:cNvPr>
-          <p:cNvSpPr>
-            <a:spLocks noGrp="1"/>
-          </p:cNvSpPr>
-          <p:nvPr>
-            <p:ph type="ctrTitle"/>
-          </p:nvPr>
-        </p:nvSpPr>
-        <p:spPr>
-          <a:xfrm>
-            <a:off x="1859280" y="631940"/>
-            <a:ext cx="40172640" cy="3604699"/>
-          </a:xfrm>
-          <a:solidFill>
-            <a:schemeClr val="accent3">
-              <a:lumMod val="20000"/>
-              <a:lumOff val="80000"/>
-            </a:schemeClr>
-          </a:solidFill>
-        </p:spPr>
-        <p:txBody>
-          <a:bodyPr>
-            <a:normAutofit/>
-          </a:bodyPr>
-          <a:lstStyle/>
-          <a:p>
-            <a:r>
-              <a:rPr lang="en-US" sz="8000" dirty="0"/>
-              <a:t>Optimizing Cookie Recipes for Ratings Using Machine Learning and Deep Vector-to-Sequence Recurrent Neural Models</a:t>
-            </a:r>
-            <a:br>
-              <a:rPr lang="en-US" sz="20000" dirty="0"/>
-            </a:br>
-            <a:r>
-              <a:rPr lang="en-US" sz="5000" dirty="0"/>
-              <a:t>Mackenzie O’Brien and Dr. Pablo Rivas</a:t>
-            </a:r>
-          </a:p>
-        </p:txBody>
-      </p:sp>
       <p:grpSp>
         <p:nvGrpSpPr>
           <p:cNvPr id="11" name="Group 10">
@@ -3486,9 +3438,9 @@
         <p:grpSpPr>
           <a:xfrm>
             <a:off x="1946154" y="4782376"/>
-            <a:ext cx="12801600" cy="8311586"/>
+            <a:ext cx="12801600" cy="8936757"/>
             <a:chOff x="1859278" y="5350030"/>
-            <a:chExt cx="12801600" cy="8311586"/>
+            <a:chExt cx="12801600" cy="8936757"/>
           </a:xfrm>
         </p:grpSpPr>
         <p:sp>
@@ -3505,8 +3457,8 @@
           </p:nvSpPr>
           <p:spPr>
             <a:xfrm>
-              <a:off x="1859278" y="6540157"/>
-              <a:ext cx="12801599" cy="7121459"/>
+              <a:off x="1859278" y="6540156"/>
+              <a:ext cx="12801599" cy="7746631"/>
             </a:xfrm>
             <a:prstGeom prst="rect">
               <a:avLst/>
@@ -3606,8 +3558,8 @@
         </p:nvSpPr>
         <p:spPr>
           <a:xfrm>
-            <a:off x="2364263" y="6141673"/>
-            <a:ext cx="11766483" cy="6986528"/>
+            <a:off x="1880994" y="6261376"/>
+            <a:ext cx="12801601" cy="7048083"/>
           </a:xfrm>
           <a:prstGeom prst="rect">
             <a:avLst/>
@@ -3615,47 +3567,44 @@
           <a:noFill/>
         </p:spPr>
         <p:txBody>
-          <a:bodyPr wrap="square" rtlCol="0">
+          <a:bodyPr wrap="square" lIns="274320" rIns="274320" rtlCol="0">
             <a:spAutoFit/>
           </a:bodyPr>
           <a:lstStyle/>
           <a:p>
             <a:pPr algn="just"/>
             <a:r>
-              <a:rPr lang="en-US" sz="3200" dirty="0"/>
+              <a:rPr lang="en-US" sz="3500" dirty="0"/>
               <a:t>This project employed machine learning concepts and processes in an attempt to teach a computer an algorithm that outputs a cookie recipe that is comparable to human-made recipes.</a:t>
             </a:r>
           </a:p>
           <a:p>
             <a:pPr algn="just"/>
-            <a:r>
-              <a:rPr lang="en-US" sz="3200" dirty="0"/>
-              <a:t> </a:t>
-            </a:r>
+            <a:endParaRPr lang="en-US" sz="1600" dirty="0"/>
           </a:p>
           <a:p>
             <a:pPr algn="just"/>
             <a:r>
-              <a:rPr lang="en-US" sz="3200" dirty="0"/>
+              <a:rPr lang="en-US" sz="3500" dirty="0"/>
               <a:t>The process involved feeding the algorithms a data set of cookie recipes that included details such as ingredients, ratings, and calories. A second algorithm was used to construct instructions for a recipe once ingredients were selected based off of instructions from the dataset of recipes.</a:t>
             </a:r>
           </a:p>
           <a:p>
             <a:pPr algn="just"/>
-            <a:endParaRPr lang="en-US" sz="3200" dirty="0"/>
+            <a:endParaRPr lang="en-US" sz="1600" dirty="0"/>
           </a:p>
           <a:p>
             <a:pPr algn="just"/>
             <a:r>
-              <a:rPr lang="en-US" sz="3200" dirty="0"/>
+              <a:rPr lang="en-US" sz="3500" dirty="0"/>
               <a:t>The recipes were gathered by scraping the website </a:t>
             </a:r>
             <a:r>
-              <a:rPr lang="en-US" sz="3200" dirty="0" err="1"/>
+              <a:rPr lang="en-US" sz="3500" dirty="0" err="1"/>
               <a:t>allrecipes.com</a:t>
             </a:r>
             <a:r>
-              <a:rPr lang="en-US" sz="3200" dirty="0"/>
+              <a:rPr lang="en-US" sz="3500" dirty="0"/>
               <a:t> for chocolate chip cookie recipes that were compiled in order to “teach” the computer to recognize tasty cookies by looking at things such as reviews, ingredients, and calories.</a:t>
             </a:r>
           </a:p>
@@ -3675,10 +3624,10 @@
         </p:nvGrpSpPr>
         <p:grpSpPr>
           <a:xfrm>
-            <a:off x="29230320" y="21168550"/>
-            <a:ext cx="12801600" cy="5517779"/>
-            <a:chOff x="15109228" y="2105080"/>
-            <a:chExt cx="12801600" cy="9142422"/>
+            <a:off x="29301341" y="17961201"/>
+            <a:ext cx="12866760" cy="8393075"/>
+            <a:chOff x="15109228" y="-3444940"/>
+            <a:chExt cx="12866760" cy="14088862"/>
           </a:xfrm>
         </p:grpSpPr>
         <p:sp>
@@ -3695,8 +3644,8 @@
           </p:nvSpPr>
           <p:spPr>
             <a:xfrm>
-              <a:off x="15109228" y="4170399"/>
-              <a:ext cx="12801600" cy="7077103"/>
+              <a:off x="15109228" y="-1379618"/>
+              <a:ext cx="12801600" cy="12023540"/>
             </a:xfrm>
             <a:prstGeom prst="rect">
               <a:avLst/>
@@ -3750,7 +3699,7 @@
           </p:nvSpPr>
           <p:spPr>
             <a:xfrm>
-              <a:off x="15109228" y="2105080"/>
+              <a:off x="15174388" y="-3444940"/>
               <a:ext cx="12801600" cy="2065321"/>
             </a:xfrm>
             <a:prstGeom prst="rect">
@@ -3792,10 +3741,10 @@
         </p:nvGrpSpPr>
         <p:grpSpPr>
           <a:xfrm>
-            <a:off x="15577376" y="4646168"/>
-            <a:ext cx="12823319" cy="28236542"/>
-            <a:chOff x="15869841" y="5618228"/>
-            <a:chExt cx="12823319" cy="23456039"/>
+            <a:off x="15154637" y="4782376"/>
+            <a:ext cx="13611917" cy="17978279"/>
+            <a:chOff x="15468821" y="5618228"/>
+            <a:chExt cx="13611917" cy="14934521"/>
           </a:xfrm>
         </p:grpSpPr>
         <p:grpSp>
@@ -3812,10 +3761,10 @@
           </p:nvGrpSpPr>
           <p:grpSpPr>
             <a:xfrm>
-              <a:off x="15869841" y="5618228"/>
-              <a:ext cx="12801600" cy="22676886"/>
-              <a:chOff x="29230320" y="5193030"/>
-              <a:chExt cx="12801600" cy="10490099"/>
+              <a:off x="15525702" y="5618228"/>
+              <a:ext cx="13555036" cy="14934521"/>
+              <a:chOff x="28886181" y="5193030"/>
+              <a:chExt cx="13555036" cy="6908559"/>
             </a:xfrm>
           </p:grpSpPr>
           <p:sp>
@@ -3832,8 +3781,8 @@
             </p:nvSpPr>
             <p:spPr>
               <a:xfrm>
-                <a:off x="29230320" y="5758216"/>
-                <a:ext cx="12801600" cy="9924913"/>
+                <a:off x="28892045" y="5648203"/>
+                <a:ext cx="13549172" cy="6453386"/>
               </a:xfrm>
               <a:prstGeom prst="rect">
                 <a:avLst/>
@@ -3847,6 +3796,9 @@
               <a:ln>
                 <a:noFill/>
               </a:ln>
+              <a:effectLst>
+                <a:softEdge rad="0"/>
+              </a:effectLst>
             </p:spPr>
             <p:style>
               <a:lnRef idx="2">
@@ -3887,8 +3839,8 @@
             </p:nvSpPr>
             <p:spPr>
               <a:xfrm>
-                <a:off x="29230320" y="5193030"/>
-                <a:ext cx="12801600" cy="576616"/>
+                <a:off x="28886181" y="5193030"/>
+                <a:ext cx="13452257" cy="478994"/>
               </a:xfrm>
               <a:prstGeom prst="rect">
                 <a:avLst/>
@@ -3929,8 +3881,8 @@
           </p:nvSpPr>
           <p:spPr>
             <a:xfrm>
-              <a:off x="16300274" y="6982458"/>
-              <a:ext cx="11944350" cy="2884347"/>
+              <a:off x="15525702" y="6720372"/>
+              <a:ext cx="13452257" cy="2441642"/>
             </a:xfrm>
             <a:prstGeom prst="rect">
               <a:avLst/>
@@ -3938,7 +3890,7 @@
             <a:noFill/>
           </p:spPr>
           <p:txBody>
-            <a:bodyPr wrap="square" rtlCol="0">
+            <a:bodyPr wrap="square" lIns="274320" rIns="274320" rtlCol="0">
               <a:spAutoFit/>
             </a:bodyPr>
             <a:lstStyle/>
@@ -3952,15 +3904,15 @@
             <a:p>
               <a:pPr algn="just"/>
               <a:r>
-                <a:rPr lang="en-US" sz="3200" dirty="0"/>
-                <a:t>Python scripts were employed to scrape over 250 chocolate chip cookie recipes from </a:t>
+                <a:rPr lang="en-US" sz="3500" dirty="0"/>
+                <a:t>Python scripts were used to scrape over 250 chocolate chip cookie recipes from </a:t>
               </a:r>
               <a:r>
-                <a:rPr lang="en-US" sz="3200" dirty="0" err="1"/>
+                <a:rPr lang="en-US" sz="3500" dirty="0" err="1"/>
                 <a:t>allrecipes.com</a:t>
               </a:r>
               <a:r>
-                <a:rPr lang="en-US" sz="3200" dirty="0"/>
+                <a:rPr lang="en-US" sz="3500" dirty="0"/>
                 <a:t>. This data was then cleaned and inputted into two spreadsheets, one for ingredients and one for instructions,  for further use.</a:t>
               </a:r>
             </a:p>
@@ -3980,8 +3932,8 @@
           </p:nvSpPr>
           <p:spPr>
             <a:xfrm>
-              <a:off x="15869841" y="21276351"/>
-              <a:ext cx="12801600" cy="7797916"/>
+              <a:off x="15533981" y="15421807"/>
+              <a:ext cx="13368945" cy="4870502"/>
             </a:xfrm>
             <a:prstGeom prst="rect">
               <a:avLst/>
@@ -4003,20 +3955,30 @@
             <a:p>
               <a:pPr algn="just"/>
               <a:r>
-                <a:rPr lang="en-US" sz="4500" dirty="0"/>
-                <a:t>In order to get instructions unique to each generated recipe, we used a Long Short-Term Memory Recurrent Neural network, through which we fed in the generated recipe as an attention mechanism. The attention mechanism combined with the memory then trains the model to output a sequence of words that it believes are correct. The LSTM at each iteration outputs the word with the highest probability into a sequence and then feeds that outputted word back into the network as “memory”.</a:t>
+                <a:rPr lang="en-US" sz="4000" dirty="0"/>
+                <a:t>Long Short-Term Memory Recurrent Neural Network </a:t>
+              </a:r>
+            </a:p>
+            <a:p>
+              <a:pPr algn="just"/>
+              <a:r>
+                <a:rPr lang="en-US" sz="3500" dirty="0"/>
+                <a:t>We used each generated recipe as an attention mechanism, which when combined with LSTM, trains the model to output a sequence of words that it believes are good recipe.</a:t>
               </a:r>
             </a:p>
             <a:p>
               <a:pPr algn="ctr"/>
-              <a:endParaRPr lang="en-US" sz="3200" dirty="0"/>
+              <a:r>
+                <a:rPr lang="en-US" sz="4500" dirty="0"/>
+                <a:t>Testing the Cookies</a:t>
+              </a:r>
             </a:p>
             <a:p>
-              <a:pPr marL="457200" indent="-457200">
-                <a:buFont typeface="Arial" panose="020B0604020202020204" pitchFamily="34" charset="0"/>
-                <a:buChar char="•"/>
-              </a:pPr>
-              <a:endParaRPr lang="en-US" sz="3200" dirty="0"/>
+              <a:pPr algn="just"/>
+              <a:r>
+                <a:rPr lang="en-US" sz="3500" dirty="0"/>
+                <a:t>We did 5 taste tests, each time with a different generated cookie against the same control cookie. We alternated which cookie was 1 or 2 and tested on Mondays and Fridays on campus, serving 40 of each cookie. Generally, we got around 30 responses to our survey for each</a:t>
+              </a:r>
             </a:p>
           </p:txBody>
         </p:sp>
@@ -4034,8 +3996,8 @@
           </p:nvSpPr>
           <p:spPr>
             <a:xfrm>
-              <a:off x="15963860" y="9820956"/>
-              <a:ext cx="12729300" cy="10844501"/>
+              <a:off x="15468821" y="9181397"/>
+              <a:ext cx="13611917" cy="6212766"/>
             </a:xfrm>
             <a:prstGeom prst="rect">
               <a:avLst/>
@@ -4055,69 +4017,51 @@
               </a:r>
             </a:p>
             <a:p>
+              <a:pPr algn="ctr"/>
+              <a:r>
+                <a:rPr lang="en-US" sz="4000" dirty="0"/>
+                <a:t>Deep Learning Neural Network</a:t>
+              </a:r>
+            </a:p>
+            <a:p>
               <a:pPr algn="just"/>
               <a:r>
-                <a:rPr lang="en-US" sz="4000" dirty="0"/>
-                <a:t> </a:t>
+                <a:rPr lang="en-US" sz="3200" dirty="0"/>
+                <a:t>T</a:t>
               </a:r>
               <a:r>
-                <a:rPr lang="en-US" sz="3200" dirty="0"/>
-                <a:t>We began by training 9 different machine learning algorithms. After analysis of recipes produced by each, we chose 5 recipes from 3 different algorithms.</a:t>
+                <a:rPr lang="en-US" sz="3500" dirty="0"/>
+                <a:t>his a nonlinear artificial neural network with multiple layers between the input and output layers. Each mathematical manipulation of the data is considered a layer, and complex DNN have many layers.</a:t>
               </a:r>
             </a:p>
             <a:p>
               <a:pPr algn="ctr"/>
               <a:r>
                 <a:rPr lang="en-US" sz="4000" dirty="0"/>
-                <a:t>   Deep Learning</a:t>
-              </a:r>
-            </a:p>
-            <a:p>
-              <a:pPr algn="ctr"/>
-              <a:endParaRPr lang="en-US" sz="4000" dirty="0"/>
-            </a:p>
-            <a:p>
-              <a:pPr algn="ctr"/>
-              <a:endParaRPr lang="en-US" sz="4000" dirty="0"/>
-            </a:p>
-            <a:p>
-              <a:pPr algn="ctr"/>
-              <a:r>
-                <a:rPr lang="en-US" sz="4000" dirty="0"/>
-                <a:t>   Extremely Randomized Trees</a:t>
+                <a:t>Extremely Randomized Trees</a:t>
               </a:r>
             </a:p>
             <a:p>
               <a:pPr algn="just"/>
               <a:r>
-                <a:rPr lang="en-US" sz="3200" dirty="0"/>
-                <a:t>The algorithm is a variant of the Random Forest regression that picks a decision boundary at random by using the entire sample  at each step of the extreme tree.. It uses a plethora of decision trees and merges them to make a stable and accurate prediction.</a:t>
-              </a:r>
-            </a:p>
-            <a:p>
-              <a:r>
-                <a:rPr lang="en-US" sz="3000" dirty="0"/>
-                <a:t>	</a:t>
+                <a:rPr lang="en-US" sz="3500" dirty="0"/>
+                <a:t>The algorithm is a variant of the Random Forest regression that picks a decision boundary at random by using the entire sample  at each step of the extreme tree.</a:t>
               </a:r>
             </a:p>
             <a:p>
               <a:pPr algn="ctr"/>
               <a:r>
                 <a:rPr lang="en-US" sz="4000" dirty="0"/>
-                <a:t>   Gradient Boosting</a:t>
+                <a:t> Gradient Boosting</a:t>
               </a:r>
-              <a:r>
-                <a:rPr lang="en-US" sz="3000" dirty="0"/>
-                <a:t>:</a:t>
-              </a:r>
+              <a:endParaRPr lang="en-US" sz="3000" dirty="0"/>
             </a:p>
             <a:p>
               <a:pPr algn="just"/>
               <a:r>
-                <a:rPr lang="en-US" sz="3200" dirty="0"/>
-                <a:t>The gradient boosting algorithm applies the concept of modifying a weak learner to become better at identifying good outcomes more efficiently. The model uses an ensemble of weak prediction models, typically decision trees, to make predictions. The gradient boosting algorithm attempts to minimize errors through a loss function. </a:t>
+                <a:rPr lang="en-US" sz="3500" dirty="0"/>
+                <a:t>The gradient boosting algorithm applies the concept of modifying a weak learner to become better at identifying good outcomes more efficiently. </a:t>
               </a:r>
-              <a:endParaRPr lang="en-US" sz="4000" dirty="0"/>
             </a:p>
           </p:txBody>
         </p:sp>
@@ -4136,10 +4080,10 @@
         </p:nvGrpSpPr>
         <p:grpSpPr>
           <a:xfrm>
-            <a:off x="29230320" y="4726007"/>
-            <a:ext cx="12801600" cy="16045157"/>
-            <a:chOff x="29230320" y="5222080"/>
-            <a:chExt cx="12801600" cy="16884886"/>
+            <a:off x="15152221" y="23496079"/>
+            <a:ext cx="13614333" cy="8448680"/>
+            <a:chOff x="28826883" y="7189010"/>
+            <a:chExt cx="13614333" cy="10152392"/>
           </a:xfrm>
         </p:grpSpPr>
         <p:grpSp>
@@ -4156,10 +4100,10 @@
           </p:nvGrpSpPr>
           <p:grpSpPr>
             <a:xfrm>
-              <a:off x="29230320" y="5222080"/>
-              <a:ext cx="12801600" cy="16884886"/>
-              <a:chOff x="15544800" y="5193030"/>
-              <a:chExt cx="12801600" cy="12237720"/>
+              <a:off x="28892044" y="7189010"/>
+              <a:ext cx="13549172" cy="10152392"/>
+              <a:chOff x="15206524" y="6618608"/>
+              <a:chExt cx="13549172" cy="7358185"/>
             </a:xfrm>
           </p:grpSpPr>
           <p:sp>
@@ -4176,8 +4120,8 @@
             </p:nvSpPr>
             <p:spPr>
               <a:xfrm>
-                <a:off x="15544800" y="6067118"/>
-                <a:ext cx="12801600" cy="11363632"/>
+                <a:off x="15206524" y="7475016"/>
+                <a:ext cx="13446393" cy="6501777"/>
               </a:xfrm>
               <a:prstGeom prst="rect">
                 <a:avLst/>
@@ -4231,8 +4175,8 @@
             </p:nvSpPr>
             <p:spPr>
               <a:xfrm>
-                <a:off x="15544800" y="5193030"/>
-                <a:ext cx="12801600" cy="903427"/>
+                <a:off x="15206524" y="6618608"/>
+                <a:ext cx="13549172" cy="1085606"/>
               </a:xfrm>
               <a:prstGeom prst="rect">
                 <a:avLst/>
@@ -4273,8 +4217,8 @@
           </p:nvSpPr>
           <p:spPr>
             <a:xfrm>
-              <a:off x="29230320" y="6598457"/>
-              <a:ext cx="12801600" cy="707886"/>
+              <a:off x="28826883" y="8524325"/>
+              <a:ext cx="13511553" cy="4179203"/>
             </a:xfrm>
             <a:prstGeom prst="rect">
               <a:avLst/>
@@ -4282,15 +4226,22 @@
             <a:noFill/>
           </p:spPr>
           <p:txBody>
-            <a:bodyPr wrap="square" rtlCol="0">
+            <a:bodyPr wrap="square" lIns="274320" rIns="274320" rtlCol="0">
               <a:spAutoFit/>
             </a:bodyPr>
             <a:lstStyle/>
             <a:p>
               <a:pPr algn="ctr"/>
               <a:r>
-                <a:rPr lang="en-US" sz="4000" dirty="0"/>
-                <a:t>Ingredients Vectors</a:t>
+                <a:rPr lang="en-US" sz="4500" dirty="0"/>
+                <a:t>Ingredients</a:t>
+              </a:r>
+            </a:p>
+            <a:p>
+              <a:pPr algn="just"/>
+              <a:r>
+                <a:rPr lang="en-US" sz="3500" dirty="0"/>
+                <a:t>Batch B had the best results, followed by batch A, but none of the recipes made by algorithms beat the control cookie. Overall, the recipes generated had good responses when they were tested. Recipe E had to be modified, as it included no wet ingredients, and thus would not correctly form dough..</a:t>
               </a:r>
             </a:p>
           </p:txBody>
@@ -4309,8 +4260,8 @@
           </p:nvSpPr>
           <p:spPr>
             <a:xfrm>
-              <a:off x="29230321" y="17596812"/>
-              <a:ext cx="12758162" cy="4372437"/>
+              <a:off x="28967239" y="12764620"/>
+              <a:ext cx="13296165" cy="4179203"/>
             </a:xfrm>
             <a:prstGeom prst="rect">
               <a:avLst/>
@@ -4325,15 +4276,15 @@
             <a:p>
               <a:pPr algn="ctr"/>
               <a:r>
-                <a:rPr lang="en-US" sz="4000" dirty="0"/>
+                <a:rPr lang="en-US" sz="4500" dirty="0"/>
                 <a:t>Vector-to-Sequence Instructions</a:t>
               </a:r>
             </a:p>
             <a:p>
               <a:pPr algn="just"/>
               <a:r>
-                <a:rPr lang="en-US" sz="3200" dirty="0"/>
-                <a:t>	As the vector-to-sequence algorithm is previously untested in other research, the end results leave something to desire in terms of ability to finesse and actual usability. However, it is an accomplishment to have gotten a working algorithm that takes in an ingredient vector and outputs a semi-usable recipe. Improvements include ensuring that the instructions contain all ingredients in the vector that contain non-zero values and eliminating repeating loops that the algorithm gets stuck on.</a:t>
+                <a:rPr lang="en-US" sz="3500" dirty="0"/>
+                <a:t>Recipe instructions were created, however some were not viable for use, and none  generated a sequence that included every ingredient in the recipe fed into it. This may be because our dataset was not robust enough, but that can possibly be remedied through using more recipes during training the algorithm in further testing.</a:t>
               </a:r>
             </a:p>
           </p:txBody>
@@ -4353,10 +4304,10 @@
         </p:nvGrpSpPr>
         <p:grpSpPr>
           <a:xfrm>
-            <a:off x="1946155" y="13300470"/>
-            <a:ext cx="12801600" cy="15841661"/>
-            <a:chOff x="1946155" y="13620510"/>
-            <a:chExt cx="12801600" cy="15841661"/>
+            <a:off x="1946154" y="14062018"/>
+            <a:ext cx="12801600" cy="14122191"/>
+            <a:chOff x="1946155" y="14603373"/>
+            <a:chExt cx="12801600" cy="14122191"/>
           </a:xfrm>
         </p:grpSpPr>
         <p:grpSp>
@@ -4373,10 +4324,10 @@
           </p:nvGrpSpPr>
           <p:grpSpPr>
             <a:xfrm>
-              <a:off x="1946155" y="13620510"/>
-              <a:ext cx="12801600" cy="15841661"/>
-              <a:chOff x="1946155" y="14597865"/>
-              <a:chExt cx="12801600" cy="15841661"/>
+              <a:off x="1946155" y="14603373"/>
+              <a:ext cx="12801600" cy="14122191"/>
+              <a:chOff x="1946155" y="15580728"/>
+              <a:chExt cx="12801600" cy="14122191"/>
             </a:xfrm>
           </p:grpSpPr>
           <p:grpSp>
@@ -4393,10 +4344,10 @@
             </p:nvGrpSpPr>
             <p:grpSpPr>
               <a:xfrm>
-                <a:off x="1946155" y="14597865"/>
-                <a:ext cx="12801600" cy="15841661"/>
-                <a:chOff x="1920204" y="15350897"/>
-                <a:chExt cx="12801600" cy="15841661"/>
+                <a:off x="1946155" y="15580728"/>
+                <a:ext cx="12801600" cy="14122191"/>
+                <a:chOff x="1920204" y="16333760"/>
+                <a:chExt cx="12801600" cy="14122191"/>
               </a:xfrm>
             </p:grpSpPr>
             <p:grpSp>
@@ -4413,10 +4364,10 @@
               </p:nvGrpSpPr>
               <p:grpSpPr>
                 <a:xfrm>
-                  <a:off x="1920204" y="16593297"/>
-                  <a:ext cx="12801600" cy="14599261"/>
-                  <a:chOff x="2584244" y="18547360"/>
-                  <a:chExt cx="12280123" cy="12742356"/>
+                  <a:off x="1920204" y="17503182"/>
+                  <a:ext cx="12801600" cy="12952769"/>
+                  <a:chOff x="2584244" y="19341515"/>
+                  <a:chExt cx="12280123" cy="11305284"/>
                 </a:xfrm>
               </p:grpSpPr>
               <p:sp>
@@ -4433,8 +4384,8 @@
                 </p:nvSpPr>
                 <p:spPr>
                   <a:xfrm>
-                    <a:off x="2584244" y="18547360"/>
-                    <a:ext cx="12280123" cy="12742356"/>
+                    <a:off x="2584244" y="19341515"/>
+                    <a:ext cx="12280123" cy="11305284"/>
                   </a:xfrm>
                   <a:prstGeom prst="rect">
                     <a:avLst/>
@@ -4496,8 +4447,8 @@
                 </p:blipFill>
                 <p:spPr>
                   <a:xfrm rot="16200000">
-                    <a:off x="7875195" y="19698682"/>
-                    <a:ext cx="7246409" cy="5548186"/>
+                    <a:off x="8293980" y="20320466"/>
+                    <a:ext cx="6604251" cy="5148820"/>
                   </a:xfrm>
                   <a:prstGeom prst="rect">
                     <a:avLst/>
@@ -4525,8 +4476,8 @@
                 </p:blipFill>
                 <p:spPr>
                   <a:xfrm>
-                    <a:off x="2985321" y="18842267"/>
-                    <a:ext cx="5452311" cy="4069948"/>
+                    <a:off x="3332308" y="19603210"/>
+                    <a:ext cx="5016368" cy="3744533"/>
                   </a:xfrm>
                   <a:prstGeom prst="rect">
                     <a:avLst/>
@@ -4554,8 +4505,8 @@
                 </p:blipFill>
                 <p:spPr>
                   <a:xfrm>
-                    <a:off x="2995407" y="22912215"/>
-                    <a:ext cx="5442225" cy="3167007"/>
+                    <a:off x="3353145" y="23277812"/>
+                    <a:ext cx="5016369" cy="2919188"/>
                   </a:xfrm>
                   <a:prstGeom prst="rect">
                     <a:avLst/>
@@ -4577,7 +4528,7 @@
               </p:nvSpPr>
               <p:spPr>
                 <a:xfrm>
-                  <a:off x="1920204" y="15350897"/>
+                  <a:off x="1920204" y="16333760"/>
                   <a:ext cx="12801598" cy="1246495"/>
                 </a:xfrm>
                 <a:prstGeom prst="rect">
@@ -4619,8 +4570,8 @@
             </p:nvSpPr>
             <p:spPr>
               <a:xfrm>
-                <a:off x="3117566" y="23920705"/>
-                <a:ext cx="5229388" cy="553998"/>
+                <a:off x="3622628" y="24087821"/>
+                <a:ext cx="4562304" cy="477054"/>
               </a:xfrm>
               <a:prstGeom prst="rect">
                 <a:avLst/>
@@ -4635,7 +4586,7 @@
               <a:p>
                 <a:pPr algn="l"/>
                 <a:r>
-                  <a:rPr lang="en-US" sz="2900" dirty="0"/>
+                  <a:rPr lang="en-US" sz="2500" dirty="0"/>
                   <a:t>Deep Learning Neural Network</a:t>
                 </a:r>
               </a:p>
@@ -4656,8 +4607,8 @@
           </p:nvSpPr>
           <p:spPr>
             <a:xfrm>
-              <a:off x="8449139" y="22938369"/>
-              <a:ext cx="5961048" cy="553998"/>
+              <a:off x="8819287" y="23110465"/>
+              <a:ext cx="4990498" cy="477054"/>
             </a:xfrm>
             <a:prstGeom prst="rect">
               <a:avLst/>
@@ -4672,7 +4623,7 @@
             <a:p>
               <a:pPr algn="l"/>
               <a:r>
-                <a:rPr lang="en-US" sz="2900" dirty="0"/>
+                <a:rPr lang="en-US" sz="2500" dirty="0"/>
                 <a:t>Extreme Trees and Gradient Boosting</a:t>
               </a:r>
             </a:p>
@@ -4693,10 +4644,10 @@
         </p:nvGrpSpPr>
         <p:grpSpPr>
           <a:xfrm>
-            <a:off x="2048338" y="29352779"/>
-            <a:ext cx="12801601" cy="2649636"/>
+            <a:off x="1924431" y="28441032"/>
+            <a:ext cx="12801601" cy="3503727"/>
             <a:chOff x="33797164" y="27737274"/>
-            <a:chExt cx="8234756" cy="2649636"/>
+            <a:chExt cx="8234756" cy="3503727"/>
           </a:xfrm>
         </p:grpSpPr>
         <p:sp>
@@ -4713,8 +4664,8 @@
           </p:nvSpPr>
           <p:spPr>
             <a:xfrm>
-              <a:off x="33797164" y="28586209"/>
-              <a:ext cx="8234756" cy="1800701"/>
+              <a:off x="33797165" y="28586208"/>
+              <a:ext cx="8234755" cy="2654793"/>
             </a:xfrm>
             <a:prstGeom prst="rect">
               <a:avLst/>
@@ -4809,8 +4760,8 @@
           </p:nvSpPr>
           <p:spPr>
             <a:xfrm>
-              <a:off x="33853046" y="28698040"/>
-              <a:ext cx="8178872" cy="1631216"/>
+              <a:off x="33844896" y="29066517"/>
+              <a:ext cx="8159082" cy="1815882"/>
             </a:xfrm>
             <a:prstGeom prst="rect">
               <a:avLst/>
@@ -4818,43 +4769,43 @@
             <a:noFill/>
           </p:spPr>
           <p:txBody>
-            <a:bodyPr wrap="square" rtlCol="0">
+            <a:bodyPr wrap="square" lIns="274320" rIns="274320" rtlCol="0">
               <a:spAutoFit/>
             </a:bodyPr>
             <a:lstStyle/>
             <a:p>
               <a:pPr algn="just"/>
               <a:r>
-                <a:rPr lang="en-US" sz="2500" dirty="0"/>
+                <a:rPr lang="en-US" sz="2800" dirty="0"/>
                 <a:t>Clifford, Catherine. “Alphabet Billionaire Eric Schmidt: Google Used A.I. to</a:t>
               </a:r>
             </a:p>
             <a:p>
               <a:pPr algn="just"/>
               <a:r>
-                <a:rPr lang="en-US" sz="2500" dirty="0"/>
+                <a:rPr lang="en-US" sz="2800" dirty="0"/>
                 <a:t>	 Find the Perfect Chocolate Chip Cookie Recipe.” CNBC, CNBC, 29 Jan. 2018.</a:t>
               </a:r>
             </a:p>
             <a:p>
               <a:pPr algn="just"/>
               <a:r>
-                <a:rPr lang="en-US" sz="2500" dirty="0"/>
+                <a:rPr lang="en-US" sz="2800" dirty="0"/>
                 <a:t>Kochanski, Greg et al. “Bayesian Optimization for a Better Dessert.” (2017).</a:t>
               </a:r>
             </a:p>
             <a:p>
               <a:pPr algn="just"/>
               <a:r>
-                <a:rPr lang="en-US" sz="2500" dirty="0"/>
+                <a:rPr lang="en-US" sz="2800" dirty="0"/>
                 <a:t>Naik, </a:t>
               </a:r>
               <a:r>
-                <a:rPr lang="en-US" sz="2500" dirty="0" err="1"/>
+                <a:rPr lang="en-US" sz="2800" dirty="0" err="1"/>
                 <a:t>JitendraB</a:t>
               </a:r>
               <a:r>
-                <a:rPr lang="en-US" sz="2500" dirty="0"/>
+                <a:rPr lang="en-US" sz="2800" dirty="0"/>
                 <a:t>.. “Cuisine Classification and Recipe Generation.” (2015).</a:t>
               </a:r>
             </a:p>
@@ -4875,7 +4826,7 @@
         </p:nvGrpSpPr>
         <p:grpSpPr>
           <a:xfrm>
-            <a:off x="29230320" y="27369559"/>
+            <a:off x="29230320" y="26981840"/>
             <a:ext cx="12801600" cy="4828213"/>
             <a:chOff x="15905991" y="26700239"/>
             <a:chExt cx="12801600" cy="4828213"/>
@@ -5100,8 +5051,8 @@
         </p:blipFill>
         <p:spPr>
           <a:xfrm>
-            <a:off x="2374778" y="23434431"/>
-            <a:ext cx="11755968" cy="4701593"/>
+            <a:off x="2955042" y="23321179"/>
+            <a:ext cx="10867561" cy="4346290"/>
           </a:xfrm>
           <a:prstGeom prst="rect">
             <a:avLst/>
@@ -5122,7 +5073,7 @@
         </p:nvSpPr>
         <p:spPr>
           <a:xfrm>
-            <a:off x="3263185" y="27503803"/>
+            <a:off x="3263185" y="27166941"/>
             <a:ext cx="5229388" cy="553998"/>
           </a:xfrm>
           <a:prstGeom prst="rect">
@@ -5139,13 +5090,568 @@
             <a:pPr algn="l"/>
             <a:r>
               <a:rPr lang="en-US" sz="2900" dirty="0"/>
-              <a:t>LSTM Recurrent </a:t>
-            </a:r>
-            <a:r>
-              <a:rPr lang="en-US" sz="2900"/>
-              <a:t>Neural Network</a:t>
-            </a:r>
-            <a:endParaRPr lang="en-US" sz="2900" dirty="0"/>
+              <a:t>LSTM Recurrent Neural Network</a:t>
+            </a:r>
+          </a:p>
+        </p:txBody>
+      </p:sp>
+      <p:sp>
+        <p:nvSpPr>
+          <p:cNvPr id="47" name="Rectangle 46">
+            <a:extLst>
+              <a:ext uri="{FF2B5EF4-FFF2-40B4-BE49-F238E27FC236}">
+                <a16:creationId xmlns:a16="http://schemas.microsoft.com/office/drawing/2014/main" id="{354BE66D-4ADC-EB4A-A855-F67A318A4D71}"/>
+              </a:ext>
+            </a:extLst>
+          </p:cNvPr>
+          <p:cNvSpPr/>
+          <p:nvPr/>
+        </p:nvSpPr>
+        <p:spPr>
+          <a:xfrm>
+            <a:off x="1924431" y="448462"/>
+            <a:ext cx="40107489" cy="3735500"/>
+          </a:xfrm>
+          <a:prstGeom prst="rect">
+            <a:avLst/>
+          </a:prstGeom>
+          <a:solidFill>
+            <a:schemeClr val="accent3">
+              <a:lumMod val="20000"/>
+              <a:lumOff val="80000"/>
+            </a:schemeClr>
+          </a:solidFill>
+          <a:ln>
+            <a:noFill/>
+          </a:ln>
+        </p:spPr>
+        <p:style>
+          <a:lnRef idx="2">
+            <a:schemeClr val="accent1">
+              <a:shade val="50000"/>
+            </a:schemeClr>
+          </a:lnRef>
+          <a:fillRef idx="1">
+            <a:schemeClr val="accent1"/>
+          </a:fillRef>
+          <a:effectRef idx="0">
+            <a:schemeClr val="accent1"/>
+          </a:effectRef>
+          <a:fontRef idx="minor">
+            <a:schemeClr val="lt1"/>
+          </a:fontRef>
+        </p:style>
+        <p:txBody>
+          <a:bodyPr rtlCol="0" anchor="ctr"/>
+          <a:lstStyle/>
+          <a:p>
+            <a:pPr algn="ctr"/>
+            <a:endParaRPr lang="en-US"/>
+          </a:p>
+        </p:txBody>
+      </p:sp>
+      <p:sp>
+        <p:nvSpPr>
+          <p:cNvPr id="29" name="TextBox 28">
+            <a:extLst>
+              <a:ext uri="{FF2B5EF4-FFF2-40B4-BE49-F238E27FC236}">
+                <a16:creationId xmlns:a16="http://schemas.microsoft.com/office/drawing/2014/main" id="{19FFC369-AE50-784D-B4A6-E78433A04F08}"/>
+              </a:ext>
+            </a:extLst>
+          </p:cNvPr>
+          <p:cNvSpPr txBox="1"/>
+          <p:nvPr/>
+        </p:nvSpPr>
+        <p:spPr>
+          <a:xfrm>
+            <a:off x="5732260" y="745641"/>
+            <a:ext cx="32591829" cy="3170099"/>
+          </a:xfrm>
+          <a:prstGeom prst="rect">
+            <a:avLst/>
+          </a:prstGeom>
+          <a:noFill/>
+        </p:spPr>
+        <p:txBody>
+          <a:bodyPr wrap="square" rtlCol="0">
+            <a:spAutoFit/>
+          </a:bodyPr>
+          <a:lstStyle/>
+          <a:p>
+            <a:pPr algn="ctr"/>
+            <a:r>
+              <a:rPr lang="en-US" sz="8000" dirty="0"/>
+              <a:t>Optimizing Cookie Recipes for Ratings Using Machine Learning and Deep Vector-to-Sequence Recurrent Neural Models</a:t>
+            </a:r>
+            <a:br>
+              <a:rPr lang="en-US" sz="8000" dirty="0"/>
+            </a:br>
+            <a:r>
+              <a:rPr lang="en-US" sz="4000" dirty="0"/>
+              <a:t>Mackenzie O’Brien and Dr. Pablo Rivas</a:t>
+            </a:r>
+          </a:p>
+        </p:txBody>
+      </p:sp>
+      <p:sp>
+        <p:nvSpPr>
+          <p:cNvPr id="48" name="Rectangle 47">
+            <a:extLst>
+              <a:ext uri="{FF2B5EF4-FFF2-40B4-BE49-F238E27FC236}">
+                <a16:creationId xmlns:a16="http://schemas.microsoft.com/office/drawing/2014/main" id="{28860505-5A79-D044-AAE3-6384C41FCAC2}"/>
+              </a:ext>
+            </a:extLst>
+          </p:cNvPr>
+          <p:cNvSpPr/>
+          <p:nvPr/>
+        </p:nvSpPr>
+        <p:spPr>
+          <a:xfrm>
+            <a:off x="29230319" y="5966882"/>
+            <a:ext cx="12801600" cy="11498553"/>
+          </a:xfrm>
+          <a:prstGeom prst="rect">
+            <a:avLst/>
+          </a:prstGeom>
+          <a:solidFill>
+            <a:schemeClr val="accent3">
+              <a:lumMod val="20000"/>
+              <a:lumOff val="80000"/>
+            </a:schemeClr>
+          </a:solidFill>
+          <a:ln>
+            <a:noFill/>
+          </a:ln>
+        </p:spPr>
+        <p:style>
+          <a:lnRef idx="2">
+            <a:schemeClr val="accent1">
+              <a:shade val="50000"/>
+            </a:schemeClr>
+          </a:lnRef>
+          <a:fillRef idx="1">
+            <a:schemeClr val="accent1"/>
+          </a:fillRef>
+          <a:effectRef idx="0">
+            <a:schemeClr val="accent1"/>
+          </a:effectRef>
+          <a:fontRef idx="minor">
+            <a:schemeClr val="lt1"/>
+          </a:fontRef>
+        </p:style>
+        <p:txBody>
+          <a:bodyPr rtlCol="0" anchor="ctr"/>
+          <a:lstStyle/>
+          <a:p>
+            <a:pPr algn="ctr"/>
+            <a:endParaRPr lang="en-US" dirty="0"/>
+          </a:p>
+        </p:txBody>
+      </p:sp>
+      <p:sp>
+        <p:nvSpPr>
+          <p:cNvPr id="49" name="TextBox 48">
+            <a:extLst>
+              <a:ext uri="{FF2B5EF4-FFF2-40B4-BE49-F238E27FC236}">
+                <a16:creationId xmlns:a16="http://schemas.microsoft.com/office/drawing/2014/main" id="{7EF584E7-D2CD-BE42-B6A3-5069223B3FD7}"/>
+              </a:ext>
+            </a:extLst>
+          </p:cNvPr>
+          <p:cNvSpPr txBox="1"/>
+          <p:nvPr/>
+        </p:nvSpPr>
+        <p:spPr>
+          <a:xfrm>
+            <a:off x="29230320" y="4782376"/>
+            <a:ext cx="12801600" cy="1246495"/>
+          </a:xfrm>
+          <a:prstGeom prst="rect">
+            <a:avLst/>
+          </a:prstGeom>
+          <a:solidFill>
+            <a:schemeClr val="accent4">
+              <a:lumMod val="20000"/>
+              <a:lumOff val="80000"/>
+            </a:schemeClr>
+          </a:solidFill>
+        </p:spPr>
+        <p:txBody>
+          <a:bodyPr wrap="square" rtlCol="0">
+            <a:spAutoFit/>
+          </a:bodyPr>
+          <a:lstStyle/>
+          <a:p>
+            <a:pPr algn="ctr"/>
+            <a:r>
+              <a:rPr lang="en-US" sz="7500" dirty="0"/>
+              <a:t>Graphs</a:t>
+            </a:r>
+          </a:p>
+        </p:txBody>
+      </p:sp>
+      <p:pic>
+        <p:nvPicPr>
+          <p:cNvPr id="40" name="Picture 39" descr="A close up of a device&#10;&#10;Description automatically generated">
+            <a:extLst>
+              <a:ext uri="{FF2B5EF4-FFF2-40B4-BE49-F238E27FC236}">
+                <a16:creationId xmlns:a16="http://schemas.microsoft.com/office/drawing/2014/main" id="{1FB51F21-5B13-494F-B238-F06267133939}"/>
+              </a:ext>
+            </a:extLst>
+          </p:cNvPr>
+          <p:cNvPicPr>
+            <a:picLocks noChangeAspect="1"/>
+          </p:cNvPicPr>
+          <p:nvPr/>
+        </p:nvPicPr>
+        <p:blipFill>
+          <a:blip r:embed="rId8"/>
+          <a:stretch>
+            <a:fillRect/>
+          </a:stretch>
+        </p:blipFill>
+        <p:spPr>
+          <a:xfrm>
+            <a:off x="29709866" y="13423923"/>
+            <a:ext cx="5856316" cy="3859844"/>
+          </a:xfrm>
+          <a:prstGeom prst="rect">
+            <a:avLst/>
+          </a:prstGeom>
+        </p:spPr>
+      </p:pic>
+      <p:pic>
+        <p:nvPicPr>
+          <p:cNvPr id="50" name="Picture 49" descr="A close up of a device&#10;&#10;Description automatically generated">
+            <a:extLst>
+              <a:ext uri="{FF2B5EF4-FFF2-40B4-BE49-F238E27FC236}">
+                <a16:creationId xmlns:a16="http://schemas.microsoft.com/office/drawing/2014/main" id="{1E76D311-CB6B-D54F-821F-CE2931BED486}"/>
+              </a:ext>
+            </a:extLst>
+          </p:cNvPr>
+          <p:cNvPicPr>
+            <a:picLocks noChangeAspect="1"/>
+          </p:cNvPicPr>
+          <p:nvPr/>
+        </p:nvPicPr>
+        <p:blipFill>
+          <a:blip r:embed="rId9"/>
+          <a:stretch>
+            <a:fillRect/>
+          </a:stretch>
+        </p:blipFill>
+        <p:spPr>
+          <a:xfrm>
+            <a:off x="36100969" y="13379527"/>
+            <a:ext cx="5522938" cy="3878839"/>
+          </a:xfrm>
+          <a:prstGeom prst="rect">
+            <a:avLst/>
+          </a:prstGeom>
+        </p:spPr>
+      </p:pic>
+      <p:pic>
+        <p:nvPicPr>
+          <p:cNvPr id="52" name="Picture 51" descr="A close up of a piece of paper&#10;&#10;Description automatically generated">
+            <a:extLst>
+              <a:ext uri="{FF2B5EF4-FFF2-40B4-BE49-F238E27FC236}">
+                <a16:creationId xmlns:a16="http://schemas.microsoft.com/office/drawing/2014/main" id="{D881871B-A275-6E47-88C1-E1BB9B37C608}"/>
+              </a:ext>
+            </a:extLst>
+          </p:cNvPr>
+          <p:cNvPicPr>
+            <a:picLocks noChangeAspect="1"/>
+          </p:cNvPicPr>
+          <p:nvPr/>
+        </p:nvPicPr>
+        <p:blipFill>
+          <a:blip r:embed="rId10"/>
+          <a:stretch>
+            <a:fillRect/>
+          </a:stretch>
+        </p:blipFill>
+        <p:spPr>
+          <a:xfrm>
+            <a:off x="29371885" y="6633180"/>
+            <a:ext cx="4056620" cy="2972432"/>
+          </a:xfrm>
+          <a:prstGeom prst="rect">
+            <a:avLst/>
+          </a:prstGeom>
+        </p:spPr>
+      </p:pic>
+      <p:pic>
+        <p:nvPicPr>
+          <p:cNvPr id="56" name="Picture 55" descr="A close up of a device&#10;&#10;Description automatically generated">
+            <a:extLst>
+              <a:ext uri="{FF2B5EF4-FFF2-40B4-BE49-F238E27FC236}">
+                <a16:creationId xmlns:a16="http://schemas.microsoft.com/office/drawing/2014/main" id="{54295A21-CD85-254C-B93F-6A6B7637C6DB}"/>
+              </a:ext>
+            </a:extLst>
+          </p:cNvPr>
+          <p:cNvPicPr>
+            <a:picLocks noChangeAspect="1"/>
+          </p:cNvPicPr>
+          <p:nvPr/>
+        </p:nvPicPr>
+        <p:blipFill>
+          <a:blip r:embed="rId11"/>
+          <a:stretch>
+            <a:fillRect/>
+          </a:stretch>
+        </p:blipFill>
+        <p:spPr>
+          <a:xfrm>
+            <a:off x="35958143" y="9796848"/>
+            <a:ext cx="4533804" cy="3054103"/>
+          </a:xfrm>
+          <a:prstGeom prst="rect">
+            <a:avLst/>
+          </a:prstGeom>
+        </p:spPr>
+      </p:pic>
+      <p:pic>
+        <p:nvPicPr>
+          <p:cNvPr id="58" name="Picture 57" descr="A screenshot of a cell phone&#10;&#10;Description automatically generated">
+            <a:extLst>
+              <a:ext uri="{FF2B5EF4-FFF2-40B4-BE49-F238E27FC236}">
+                <a16:creationId xmlns:a16="http://schemas.microsoft.com/office/drawing/2014/main" id="{643EDF0D-4294-3C43-AD46-F75C81323887}"/>
+              </a:ext>
+            </a:extLst>
+          </p:cNvPr>
+          <p:cNvPicPr>
+            <a:picLocks noChangeAspect="1"/>
+          </p:cNvPicPr>
+          <p:nvPr/>
+        </p:nvPicPr>
+        <p:blipFill>
+          <a:blip r:embed="rId12"/>
+          <a:stretch>
+            <a:fillRect/>
+          </a:stretch>
+        </p:blipFill>
+        <p:spPr>
+          <a:xfrm>
+            <a:off x="31117132" y="9772781"/>
+            <a:ext cx="4622746" cy="3054101"/>
+          </a:xfrm>
+          <a:prstGeom prst="rect">
+            <a:avLst/>
+          </a:prstGeom>
+        </p:spPr>
+      </p:pic>
+      <p:pic>
+        <p:nvPicPr>
+          <p:cNvPr id="60" name="Picture 59">
+            <a:extLst>
+              <a:ext uri="{FF2B5EF4-FFF2-40B4-BE49-F238E27FC236}">
+                <a16:creationId xmlns:a16="http://schemas.microsoft.com/office/drawing/2014/main" id="{C0D87A2B-3CE0-2F44-BA20-8ED120C7E085}"/>
+              </a:ext>
+            </a:extLst>
+          </p:cNvPr>
+          <p:cNvPicPr>
+            <a:picLocks noChangeAspect="1"/>
+          </p:cNvPicPr>
+          <p:nvPr/>
+        </p:nvPicPr>
+        <p:blipFill>
+          <a:blip r:embed="rId13"/>
+          <a:stretch>
+            <a:fillRect/>
+          </a:stretch>
+        </p:blipFill>
+        <p:spPr>
+          <a:xfrm>
+            <a:off x="37768255" y="6627070"/>
+            <a:ext cx="4056620" cy="2998221"/>
+          </a:xfrm>
+          <a:prstGeom prst="rect">
+            <a:avLst/>
+          </a:prstGeom>
+        </p:spPr>
+      </p:pic>
+      <p:pic>
+        <p:nvPicPr>
+          <p:cNvPr id="62" name="Picture 61" descr="A close up of a device&#10;&#10;Description automatically generated">
+            <a:extLst>
+              <a:ext uri="{FF2B5EF4-FFF2-40B4-BE49-F238E27FC236}">
+                <a16:creationId xmlns:a16="http://schemas.microsoft.com/office/drawing/2014/main" id="{40501938-9D9F-0F44-A08B-BD9BFBA0309F}"/>
+              </a:ext>
+            </a:extLst>
+          </p:cNvPr>
+          <p:cNvPicPr>
+            <a:picLocks noChangeAspect="1"/>
+          </p:cNvPicPr>
+          <p:nvPr/>
+        </p:nvPicPr>
+        <p:blipFill>
+          <a:blip r:embed="rId14"/>
+          <a:stretch>
+            <a:fillRect/>
+          </a:stretch>
+        </p:blipFill>
+        <p:spPr>
+          <a:xfrm>
+            <a:off x="33570070" y="6636099"/>
+            <a:ext cx="4056620" cy="2998221"/>
+          </a:xfrm>
+          <a:prstGeom prst="rect">
+            <a:avLst/>
+          </a:prstGeom>
+        </p:spPr>
+      </p:pic>
+      <p:sp>
+        <p:nvSpPr>
+          <p:cNvPr id="63" name="TextBox 62">
+            <a:extLst>
+              <a:ext uri="{FF2B5EF4-FFF2-40B4-BE49-F238E27FC236}">
+                <a16:creationId xmlns:a16="http://schemas.microsoft.com/office/drawing/2014/main" id="{B17A7651-7299-AE4F-ABD4-8CB3AC4E85AE}"/>
+              </a:ext>
+            </a:extLst>
+          </p:cNvPr>
+          <p:cNvSpPr txBox="1"/>
+          <p:nvPr/>
+        </p:nvSpPr>
+        <p:spPr>
+          <a:xfrm>
+            <a:off x="29419559" y="19406987"/>
+            <a:ext cx="12748542" cy="6601807"/>
+          </a:xfrm>
+          <a:prstGeom prst="rect">
+            <a:avLst/>
+          </a:prstGeom>
+          <a:noFill/>
+        </p:spPr>
+        <p:txBody>
+          <a:bodyPr wrap="square" lIns="274320" rIns="274320" rtlCol="0">
+            <a:spAutoFit/>
+          </a:bodyPr>
+          <a:lstStyle/>
+          <a:p>
+            <a:r>
+              <a:rPr lang="en-US" sz="3500" dirty="0"/>
+              <a:t>None of the cookies  generated by machine learning beat the control cookie, but we discovered that machine learning algorithms can indeed create tasty chocolate chip cookie recipes. The best algorithm out of those used was Extremely Randomized Trees.</a:t>
+            </a:r>
+          </a:p>
+          <a:p>
+            <a:endParaRPr lang="en-US" sz="3500" dirty="0"/>
+          </a:p>
+          <a:p>
+            <a:r>
+              <a:rPr lang="en-US" sz="3500" dirty="0"/>
+              <a:t>As the vector-to-sequence algorithm is previously untested in other research, the end results leave something to desire in terms of ability to finesse and actual usability. However, it is still an accomplishment to have gotten a working algorithm. Improvements include ensuring that the instructions contain all ingredients in the vector that contain non-zero values and eliminating repeating loops that the algorithm gets stuck on</a:t>
+            </a:r>
+            <a:r>
+              <a:rPr lang="en-US" sz="3800" dirty="0"/>
+              <a:t>.</a:t>
+            </a:r>
+          </a:p>
+        </p:txBody>
+      </p:sp>
+      <p:sp>
+        <p:nvSpPr>
+          <p:cNvPr id="64" name="TextBox 63">
+            <a:extLst>
+              <a:ext uri="{FF2B5EF4-FFF2-40B4-BE49-F238E27FC236}">
+                <a16:creationId xmlns:a16="http://schemas.microsoft.com/office/drawing/2014/main" id="{21CDE67C-34C3-FC4E-8D89-59F65BE0F647}"/>
+              </a:ext>
+            </a:extLst>
+          </p:cNvPr>
+          <p:cNvSpPr txBox="1"/>
+          <p:nvPr/>
+        </p:nvSpPr>
+        <p:spPr>
+          <a:xfrm>
+            <a:off x="33673104" y="6141302"/>
+            <a:ext cx="3968387" cy="477054"/>
+          </a:xfrm>
+          <a:prstGeom prst="rect">
+            <a:avLst/>
+          </a:prstGeom>
+          <a:noFill/>
+        </p:spPr>
+        <p:txBody>
+          <a:bodyPr wrap="square" rtlCol="0">
+            <a:spAutoFit/>
+          </a:bodyPr>
+          <a:lstStyle/>
+          <a:p>
+            <a:pPr algn="l"/>
+            <a:r>
+              <a:rPr lang="en-US" sz="2500" dirty="0"/>
+              <a:t>Individual Batches vs Control</a:t>
+            </a:r>
+          </a:p>
+        </p:txBody>
+      </p:sp>
+      <p:sp>
+        <p:nvSpPr>
+          <p:cNvPr id="65" name="TextBox 64">
+            <a:extLst>
+              <a:ext uri="{FF2B5EF4-FFF2-40B4-BE49-F238E27FC236}">
+                <a16:creationId xmlns:a16="http://schemas.microsoft.com/office/drawing/2014/main" id="{AFD1894A-A2E1-FC4D-B7A6-B76C1C639A4E}"/>
+              </a:ext>
+            </a:extLst>
+          </p:cNvPr>
+          <p:cNvSpPr txBox="1"/>
+          <p:nvPr/>
+        </p:nvSpPr>
+        <p:spPr>
+          <a:xfrm>
+            <a:off x="31253891" y="12926250"/>
+            <a:ext cx="3205394" cy="477054"/>
+          </a:xfrm>
+          <a:prstGeom prst="rect">
+            <a:avLst/>
+          </a:prstGeom>
+          <a:noFill/>
+        </p:spPr>
+        <p:txBody>
+          <a:bodyPr wrap="square" rtlCol="0">
+            <a:spAutoFit/>
+          </a:bodyPr>
+          <a:lstStyle/>
+          <a:p>
+            <a:pPr algn="l"/>
+            <a:r>
+              <a:rPr lang="en-US" sz="2500" dirty="0"/>
+              <a:t>All Batches vs Control</a:t>
+            </a:r>
+          </a:p>
+        </p:txBody>
+      </p:sp>
+      <p:sp>
+        <p:nvSpPr>
+          <p:cNvPr id="66" name="TextBox 65">
+            <a:extLst>
+              <a:ext uri="{FF2B5EF4-FFF2-40B4-BE49-F238E27FC236}">
+                <a16:creationId xmlns:a16="http://schemas.microsoft.com/office/drawing/2014/main" id="{8874E523-633A-974D-B494-D42B2F1DEABF}"/>
+              </a:ext>
+            </a:extLst>
+          </p:cNvPr>
+          <p:cNvSpPr txBox="1"/>
+          <p:nvPr/>
+        </p:nvSpPr>
+        <p:spPr>
+          <a:xfrm>
+            <a:off x="35584145" y="12889674"/>
+            <a:ext cx="6465737" cy="477054"/>
+          </a:xfrm>
+          <a:prstGeom prst="rect">
+            <a:avLst/>
+          </a:prstGeom>
+          <a:noFill/>
+        </p:spPr>
+        <p:txBody>
+          <a:bodyPr wrap="square" rtlCol="0">
+            <a:spAutoFit/>
+          </a:bodyPr>
+          <a:lstStyle/>
+          <a:p>
+            <a:pPr algn="ctr"/>
+            <a:r>
+              <a:rPr lang="en-US" sz="2500" dirty="0"/>
+              <a:t>Machine Learning – Control Matched By Email</a:t>
+            </a:r>
           </a:p>
         </p:txBody>
       </p:sp>

</xml_diff>